<commit_message>
Added additional content for the css presenation
</commit_message>
<xml_diff>
--- a/Intro to Web Development Part 2 HTML Basics.pptx
+++ b/Intro to Web Development Part 2 HTML Basics.pptx
@@ -4345,21 +4345,7 @@
                 <a:latin typeface="Arial" pitchFamily="34" charset="0"/>
                 <a:cs typeface="Arial" pitchFamily="34" charset="0"/>
               </a:rPr>
-              <a:t>&lt;dl&gt; </a:t>
-            </a:r>
-            <a:r>
-              <a:rPr lang="en-US" sz="2400" dirty="0" smtClean="0">
-                <a:latin typeface="Arial" pitchFamily="34" charset="0"/>
-                <a:cs typeface="Arial" pitchFamily="34" charset="0"/>
-              </a:rPr>
-              <a:t>D</a:t>
-            </a:r>
-            <a:r>
-              <a:rPr lang="en-US" sz="2400" dirty="0" smtClean="0">
-                <a:latin typeface="Arial" pitchFamily="34" charset="0"/>
-                <a:cs typeface="Arial" pitchFamily="34" charset="0"/>
-              </a:rPr>
-              <a:t>efinition List</a:t>
+              <a:t>&lt;dl&gt; Definition List</a:t>
             </a:r>
             <a:endParaRPr lang="en-US" sz="1600" dirty="0" smtClean="0">
               <a:latin typeface="Arial" pitchFamily="34" charset="0"/>
@@ -4772,14 +4758,6 @@
               </a:rPr>
               <a:t>definition lists</a:t>
             </a:r>
-            <a:endParaRPr lang="en-US" dirty="0" smtClean="0">
-              <a:solidFill>
-                <a:schemeClr val="tx2">
-                  <a:lumMod val="60000"/>
-                  <a:lumOff val="40000"/>
-                </a:schemeClr>
-              </a:solidFill>
-            </a:endParaRPr>
           </a:p>
         </p:txBody>
       </p:sp>
@@ -5454,13 +5432,20 @@
         </p:nvSpPr>
         <p:spPr/>
         <p:txBody>
-          <a:bodyPr/>
+          <a:bodyPr>
+            <a:normAutofit lnSpcReduction="10000"/>
+          </a:bodyPr>
           <a:lstStyle/>
           <a:p>
             <a:r>
               <a:rPr lang="en-US" sz="2400" dirty="0" smtClean="0"/>
-              <a:t>Create a new page called cookie-recipe.html</a:t>
-            </a:r>
+              <a:t>Create a new page called </a:t>
+            </a:r>
+            <a:r>
+              <a:rPr lang="en-US" sz="2400" dirty="0" smtClean="0"/>
+              <a:t>my-resume.html</a:t>
+            </a:r>
+            <a:endParaRPr lang="en-US" sz="2400" dirty="0" smtClean="0"/>
           </a:p>
           <a:p>
             <a:pPr>
@@ -5468,11 +5453,7 @@
             </a:pPr>
             <a:r>
               <a:rPr lang="en-US" sz="2400" dirty="0" smtClean="0"/>
-              <a:t> </a:t>
-            </a:r>
-            <a:r>
-              <a:rPr lang="en-US" sz="2400" dirty="0" smtClean="0"/>
-              <a:t>   and insert the following code</a:t>
+              <a:t>    and insert the following code</a:t>
             </a:r>
           </a:p>
           <a:p>
@@ -5487,24 +5468,54 @@
                 <a:latin typeface="Courier New" pitchFamily="49" charset="0"/>
                 <a:cs typeface="Courier New" pitchFamily="49" charset="0"/>
               </a:rPr>
-              <a:t>&lt;h1&gt;</a:t>
+              <a:t>&lt;</a:t>
             </a:r>
             <a:r>
               <a:rPr lang="en-US" sz="1800" b="1" dirty="0" smtClean="0">
-                <a:latin typeface="Courier New" pitchFamily="49" charset="0"/>
-                <a:cs typeface="Courier New" pitchFamily="49" charset="0"/>
-              </a:rPr>
-              <a:t>Chocolate Chip Cookies</a:t>
+                <a:solidFill>
+                  <a:srgbClr val="00B0F0"/>
+                </a:solidFill>
+                <a:latin typeface="Courier New" pitchFamily="49" charset="0"/>
+                <a:cs typeface="Courier New" pitchFamily="49" charset="0"/>
+              </a:rPr>
+              <a:t>h1&gt;</a:t>
             </a:r>
             <a:r>
               <a:rPr lang="en-US" sz="1800" b="1" dirty="0" smtClean="0">
+                <a:latin typeface="Courier New" pitchFamily="49" charset="0"/>
+                <a:cs typeface="Courier New" pitchFamily="49" charset="0"/>
+              </a:rPr>
+              <a:t>Your Name</a:t>
+            </a:r>
+            <a:r>
+              <a:rPr lang="en-US" sz="1800" b="1" dirty="0" smtClean="0">
                 <a:solidFill>
                   <a:srgbClr val="00B0F0"/>
                 </a:solidFill>
                 <a:latin typeface="Courier New" pitchFamily="49" charset="0"/>
                 <a:cs typeface="Courier New" pitchFamily="49" charset="0"/>
               </a:rPr>
-              <a:t>&lt;/h1&gt;</a:t>
+              <a:t>&lt;/</a:t>
+            </a:r>
+            <a:r>
+              <a:rPr lang="en-US" sz="1800" b="1" dirty="0" smtClean="0">
+                <a:solidFill>
+                  <a:srgbClr val="00B0F0"/>
+                </a:solidFill>
+                <a:latin typeface="Courier New" pitchFamily="49" charset="0"/>
+                <a:cs typeface="Courier New" pitchFamily="49" charset="0"/>
+              </a:rPr>
+              <a:t>h1</a:t>
+            </a:r>
+            <a:r>
+              <a:rPr lang="en-US" sz="1800" b="1" dirty="0" smtClean="0">
+                <a:solidFill>
+                  <a:srgbClr val="00B0F0"/>
+                </a:solidFill>
+                <a:latin typeface="Courier New" pitchFamily="49" charset="0"/>
+                <a:cs typeface="Courier New" pitchFamily="49" charset="0"/>
+              </a:rPr>
+              <a:t>&gt;</a:t>
             </a:r>
           </a:p>
           <a:p>
@@ -5526,7 +5537,7 @@
                 <a:latin typeface="Courier New" pitchFamily="49" charset="0"/>
                 <a:cs typeface="Courier New" pitchFamily="49" charset="0"/>
               </a:rPr>
-              <a:t>Ingredients</a:t>
+              <a:t>youremail@yahoo.com</a:t>
             </a:r>
             <a:r>
               <a:rPr lang="en-US" sz="1800" b="1" dirty="0" smtClean="0">
@@ -5553,7 +5564,7 @@
             <a:r>
               <a:rPr lang="en-US" sz="1800" b="1" dirty="0" smtClean="0">
                 <a:solidFill>
-                  <a:srgbClr val="C00000"/>
+                  <a:srgbClr val="00B0F0"/>
                 </a:solidFill>
                 <a:latin typeface="Courier New" pitchFamily="49" charset="0"/>
                 <a:cs typeface="Courier New" pitchFamily="49" charset="0"/>
@@ -5561,38 +5572,102 @@
               <a:t>&lt;</a:t>
             </a:r>
             <a:r>
-              <a:rPr lang="en-US" sz="1800" b="1" dirty="0" err="1" smtClean="0">
-                <a:solidFill>
-                  <a:srgbClr val="C00000"/>
-                </a:solidFill>
-                <a:latin typeface="Courier New" pitchFamily="49" charset="0"/>
-                <a:cs typeface="Courier New" pitchFamily="49" charset="0"/>
-              </a:rPr>
-              <a:t>u</a:t>
-            </a:r>
-            <a:r>
-              <a:rPr lang="en-US" sz="1800" b="1" dirty="0" err="1" smtClean="0">
-                <a:solidFill>
-                  <a:srgbClr val="C00000"/>
-                </a:solidFill>
-                <a:latin typeface="Courier New" pitchFamily="49" charset="0"/>
-                <a:cs typeface="Courier New" pitchFamily="49" charset="0"/>
-              </a:rPr>
-              <a:t>l</a:t>
-            </a:r>
-            <a:r>
               <a:rPr lang="en-US" sz="1800" b="1" dirty="0" smtClean="0">
                 <a:solidFill>
-                  <a:srgbClr val="C00000"/>
+                  <a:srgbClr val="00B0F0"/>
+                </a:solidFill>
+                <a:latin typeface="Courier New" pitchFamily="49" charset="0"/>
+                <a:cs typeface="Courier New" pitchFamily="49" charset="0"/>
+              </a:rPr>
+              <a:t>h3&gt;</a:t>
+            </a:r>
+            <a:r>
+              <a:rPr lang="en-US" sz="1800" b="1" dirty="0" smtClean="0">
+                <a:latin typeface="Courier New" pitchFamily="49" charset="0"/>
+                <a:cs typeface="Courier New" pitchFamily="49" charset="0"/>
+              </a:rPr>
+              <a:t>Phone: 555-3187</a:t>
+            </a:r>
+            <a:r>
+              <a:rPr lang="en-US" sz="1800" b="1" dirty="0" smtClean="0">
+                <a:solidFill>
+                  <a:srgbClr val="00B0F0"/>
+                </a:solidFill>
+                <a:latin typeface="Courier New" pitchFamily="49" charset="0"/>
+                <a:cs typeface="Courier New" pitchFamily="49" charset="0"/>
+              </a:rPr>
+              <a:t>&lt;/</a:t>
+            </a:r>
+            <a:r>
+              <a:rPr lang="en-US" sz="1800" b="1" dirty="0" smtClean="0">
+                <a:solidFill>
+                  <a:srgbClr val="00B0F0"/>
+                </a:solidFill>
+                <a:latin typeface="Courier New" pitchFamily="49" charset="0"/>
+                <a:cs typeface="Courier New" pitchFamily="49" charset="0"/>
+              </a:rPr>
+              <a:t>h3</a:t>
+            </a:r>
+            <a:r>
+              <a:rPr lang="en-US" sz="1800" b="1" dirty="0" smtClean="0">
+                <a:solidFill>
+                  <a:srgbClr val="00B0F0"/>
                 </a:solidFill>
                 <a:latin typeface="Courier New" pitchFamily="49" charset="0"/>
                 <a:cs typeface="Courier New" pitchFamily="49" charset="0"/>
               </a:rPr>
               <a:t>&gt;</a:t>
+            </a:r>
+          </a:p>
+          <a:p>
+            <a:pPr>
+              <a:buNone/>
+            </a:pPr>
+            <a:r>
+              <a:rPr lang="en-US" sz="1800" b="1" dirty="0" smtClean="0">
+                <a:solidFill>
+                  <a:srgbClr val="00B0F0"/>
+                </a:solidFill>
+                <a:latin typeface="Courier New" pitchFamily="49" charset="0"/>
+                <a:cs typeface="Courier New" pitchFamily="49" charset="0"/>
+              </a:rPr>
+              <a:t>&lt;hr/&gt;</a:t>
+            </a:r>
+          </a:p>
+          <a:p>
+            <a:pPr>
+              <a:buNone/>
+            </a:pPr>
+            <a:r>
+              <a:rPr lang="en-US" sz="1800" b="1" dirty="0" smtClean="0">
+                <a:solidFill>
+                  <a:srgbClr val="00B0F0"/>
+                </a:solidFill>
+                <a:latin typeface="Courier New" pitchFamily="49" charset="0"/>
+                <a:cs typeface="Courier New" pitchFamily="49" charset="0"/>
+              </a:rPr>
+              <a:t>&lt;h3&gt;</a:t>
+            </a:r>
+            <a:r>
+              <a:rPr lang="en-US" sz="1800" b="1" dirty="0" smtClean="0">
+                <a:latin typeface="Courier New" pitchFamily="49" charset="0"/>
+                <a:cs typeface="Courier New" pitchFamily="49" charset="0"/>
+              </a:rPr>
+              <a:t>Skills</a:t>
+            </a:r>
+            <a:r>
+              <a:rPr lang="en-US" sz="1800" b="1" dirty="0" smtClean="0">
+                <a:solidFill>
+                  <a:srgbClr val="00B0F0"/>
+                </a:solidFill>
+                <a:latin typeface="Courier New" pitchFamily="49" charset="0"/>
+                <a:cs typeface="Courier New" pitchFamily="49" charset="0"/>
+              </a:rPr>
+              <a:t>&lt;/h3&gt;</a:t>
             </a:r>
             <a:endParaRPr lang="en-US" sz="1800" b="1" dirty="0" smtClean="0">
               <a:solidFill>
-                <a:srgbClr val="C00000"/>
+                <a:srgbClr val="00B0F0"/>
               </a:solidFill>
               <a:latin typeface="Courier New" pitchFamily="49" charset="0"/>
               <a:cs typeface="Courier New" pitchFamily="49" charset="0"/>
@@ -5604,6 +5679,41 @@
             </a:pPr>
             <a:r>
               <a:rPr lang="en-US" sz="1800" b="1" dirty="0" smtClean="0">
+                <a:solidFill>
+                  <a:srgbClr val="C00000"/>
+                </a:solidFill>
+                <a:latin typeface="Courier New" pitchFamily="49" charset="0"/>
+                <a:cs typeface="Courier New" pitchFamily="49" charset="0"/>
+              </a:rPr>
+              <a:t>&lt;</a:t>
+            </a:r>
+            <a:r>
+              <a:rPr lang="en-US" sz="1800" b="1" dirty="0" err="1" smtClean="0">
+                <a:solidFill>
+                  <a:srgbClr val="C00000"/>
+                </a:solidFill>
+                <a:latin typeface="Courier New" pitchFamily="49" charset="0"/>
+                <a:cs typeface="Courier New" pitchFamily="49" charset="0"/>
+              </a:rPr>
+              <a:t>ul</a:t>
+            </a:r>
+            <a:r>
+              <a:rPr lang="en-US" sz="1800" b="1" dirty="0" smtClean="0">
+                <a:solidFill>
+                  <a:srgbClr val="C00000"/>
+                </a:solidFill>
+                <a:latin typeface="Courier New" pitchFamily="49" charset="0"/>
+                <a:cs typeface="Courier New" pitchFamily="49" charset="0"/>
+              </a:rPr>
+              <a:t>&gt;</a:t>
+            </a:r>
+          </a:p>
+          <a:p>
+            <a:pPr>
+              <a:buNone/>
+            </a:pPr>
+            <a:r>
+              <a:rPr lang="en-US" sz="1800" b="1" dirty="0" smtClean="0">
                 <a:latin typeface="Courier New" pitchFamily="49" charset="0"/>
                 <a:cs typeface="Courier New" pitchFamily="49" charset="0"/>
               </a:rPr>
@@ -5644,7 +5754,7 @@
                 <a:latin typeface="Courier New" pitchFamily="49" charset="0"/>
                 <a:cs typeface="Courier New" pitchFamily="49" charset="0"/>
               </a:rPr>
-              <a:t>1 cup butter, softened</a:t>
+              <a:t>Lotus 1,2,3</a:t>
             </a:r>
             <a:r>
               <a:rPr lang="en-US" sz="1800" b="1" dirty="0" smtClean="0">
@@ -5723,7 +5833,7 @@
                 <a:latin typeface="Courier New" pitchFamily="49" charset="0"/>
                 <a:cs typeface="Courier New" pitchFamily="49" charset="0"/>
               </a:rPr>
-              <a:t>1 cup white sugar</a:t>
+              <a:t>Excellent Web Surfer</a:t>
             </a:r>
             <a:r>
               <a:rPr lang="en-US" sz="1800" b="1" dirty="0" smtClean="0">
@@ -5802,7 +5912,7 @@
                 <a:latin typeface="Courier New" pitchFamily="49" charset="0"/>
                 <a:cs typeface="Courier New" pitchFamily="49" charset="0"/>
               </a:rPr>
-              <a:t>2 teaspoons of vanilla extract</a:t>
+              <a:t>HTML</a:t>
             </a:r>
             <a:r>
               <a:rPr lang="en-US" sz="1800" b="1" dirty="0" smtClean="0">
@@ -5844,14 +5954,27 @@
                 <a:latin typeface="Courier New" pitchFamily="49" charset="0"/>
                 <a:cs typeface="Courier New" pitchFamily="49" charset="0"/>
               </a:rPr>
-              <a:t> </a:t>
+              <a:t>   </a:t>
             </a:r>
             <a:r>
               <a:rPr lang="en-US" sz="1800" b="1" dirty="0" smtClean="0">
-                <a:latin typeface="Courier New" pitchFamily="49" charset="0"/>
-                <a:cs typeface="Courier New" pitchFamily="49" charset="0"/>
-              </a:rPr>
-              <a:t>  </a:t>
+                <a:solidFill>
+                  <a:srgbClr val="00B050"/>
+                </a:solidFill>
+                <a:latin typeface="Courier New" pitchFamily="49" charset="0"/>
+                <a:cs typeface="Courier New" pitchFamily="49" charset="0"/>
+              </a:rPr>
+              <a:t>&lt;</a:t>
+            </a:r>
+            <a:r>
+              <a:rPr lang="en-US" sz="1800" b="1" dirty="0" err="1" smtClean="0">
+                <a:solidFill>
+                  <a:srgbClr val="00B050"/>
+                </a:solidFill>
+                <a:latin typeface="Courier New" pitchFamily="49" charset="0"/>
+                <a:cs typeface="Courier New" pitchFamily="49" charset="0"/>
+              </a:rPr>
+              <a:t>li</a:t>
             </a:r>
             <a:r>
               <a:rPr lang="en-US" sz="1800" b="1" dirty="0" smtClean="0">
@@ -5861,6 +5984,65 @@
                 <a:latin typeface="Courier New" pitchFamily="49" charset="0"/>
                 <a:cs typeface="Courier New" pitchFamily="49" charset="0"/>
               </a:rPr>
+              <a:t>&gt;</a:t>
+            </a:r>
+            <a:r>
+              <a:rPr lang="en-US" sz="1800" b="1" dirty="0" smtClean="0">
+                <a:latin typeface="Courier New" pitchFamily="49" charset="0"/>
+                <a:cs typeface="Courier New" pitchFamily="49" charset="0"/>
+              </a:rPr>
+              <a:t>C++</a:t>
+            </a:r>
+            <a:r>
+              <a:rPr lang="en-US" sz="1800" b="1" dirty="0" smtClean="0">
+                <a:solidFill>
+                  <a:srgbClr val="00B050"/>
+                </a:solidFill>
+                <a:latin typeface="Courier New" pitchFamily="49" charset="0"/>
+                <a:cs typeface="Courier New" pitchFamily="49" charset="0"/>
+              </a:rPr>
+              <a:t>&lt;/</a:t>
+            </a:r>
+            <a:r>
+              <a:rPr lang="en-US" sz="1800" b="1" dirty="0" err="1" smtClean="0">
+                <a:solidFill>
+                  <a:srgbClr val="00B050"/>
+                </a:solidFill>
+                <a:latin typeface="Courier New" pitchFamily="49" charset="0"/>
+                <a:cs typeface="Courier New" pitchFamily="49" charset="0"/>
+              </a:rPr>
+              <a:t>li</a:t>
+            </a:r>
+            <a:r>
+              <a:rPr lang="en-US" sz="1800" b="1" dirty="0" smtClean="0">
+                <a:solidFill>
+                  <a:srgbClr val="00B050"/>
+                </a:solidFill>
+                <a:latin typeface="Courier New" pitchFamily="49" charset="0"/>
+                <a:cs typeface="Courier New" pitchFamily="49" charset="0"/>
+              </a:rPr>
+              <a:t>&gt;</a:t>
+            </a:r>
+          </a:p>
+          <a:p>
+            <a:pPr>
+              <a:buNone/>
+            </a:pPr>
+            <a:r>
+              <a:rPr lang="en-US" sz="1800" b="1" dirty="0" smtClean="0">
+                <a:latin typeface="Courier New" pitchFamily="49" charset="0"/>
+                <a:cs typeface="Courier New" pitchFamily="49" charset="0"/>
+              </a:rPr>
+              <a:t>   </a:t>
+            </a:r>
+            <a:r>
+              <a:rPr lang="en-US" sz="1800" b="1" dirty="0" smtClean="0">
+                <a:solidFill>
+                  <a:srgbClr val="00B050"/>
+                </a:solidFill>
+                <a:latin typeface="Courier New" pitchFamily="49" charset="0"/>
+                <a:cs typeface="Courier New" pitchFamily="49" charset="0"/>
+              </a:rPr>
               <a:t>&lt;</a:t>
             </a:r>
             <a:r>
@@ -5888,7 +6070,7 @@
                 <a:latin typeface="Courier New" pitchFamily="49" charset="0"/>
                 <a:cs typeface="Courier New" pitchFamily="49" charset="0"/>
               </a:rPr>
-              <a:t>3 cups all-purpose flower</a:t>
+              <a:t>MS Office</a:t>
             </a:r>
             <a:r>
               <a:rPr lang="en-US" sz="1800" b="1" dirty="0" smtClean="0">
@@ -5927,144 +6109,34 @@
             </a:pPr>
             <a:r>
               <a:rPr lang="en-US" sz="1800" b="1" dirty="0" smtClean="0">
-                <a:latin typeface="Courier New" pitchFamily="49" charset="0"/>
-                <a:cs typeface="Courier New" pitchFamily="49" charset="0"/>
-              </a:rPr>
-              <a:t> </a:t>
+                <a:solidFill>
+                  <a:srgbClr val="C00000"/>
+                </a:solidFill>
+                <a:latin typeface="Courier New" pitchFamily="49" charset="0"/>
+                <a:cs typeface="Courier New" pitchFamily="49" charset="0"/>
+              </a:rPr>
+              <a:t>&lt;/</a:t>
+            </a:r>
+            <a:r>
+              <a:rPr lang="en-US" sz="1800" b="1" dirty="0" err="1" smtClean="0">
+                <a:solidFill>
+                  <a:srgbClr val="C00000"/>
+                </a:solidFill>
+                <a:latin typeface="Courier New" pitchFamily="49" charset="0"/>
+                <a:cs typeface="Courier New" pitchFamily="49" charset="0"/>
+              </a:rPr>
+              <a:t>ul</a:t>
             </a:r>
             <a:r>
               <a:rPr lang="en-US" sz="1800" b="1" dirty="0" smtClean="0">
-                <a:latin typeface="Courier New" pitchFamily="49" charset="0"/>
-                <a:cs typeface="Courier New" pitchFamily="49" charset="0"/>
-              </a:rPr>
-              <a:t>  </a:t>
-            </a:r>
-            <a:r>
-              <a:rPr lang="en-US" sz="1800" b="1" dirty="0" smtClean="0">
-                <a:solidFill>
-                  <a:srgbClr val="00B050"/>
-                </a:solidFill>
-                <a:latin typeface="Courier New" pitchFamily="49" charset="0"/>
-                <a:cs typeface="Courier New" pitchFamily="49" charset="0"/>
-              </a:rPr>
-              <a:t>&lt;</a:t>
-            </a:r>
-            <a:r>
-              <a:rPr lang="en-US" sz="1800" b="1" dirty="0" err="1" smtClean="0">
-                <a:solidFill>
-                  <a:srgbClr val="00B050"/>
-                </a:solidFill>
-                <a:latin typeface="Courier New" pitchFamily="49" charset="0"/>
-                <a:cs typeface="Courier New" pitchFamily="49" charset="0"/>
-              </a:rPr>
-              <a:t>li</a:t>
-            </a:r>
-            <a:r>
-              <a:rPr lang="en-US" sz="1800" b="1" dirty="0" smtClean="0">
-                <a:solidFill>
-                  <a:srgbClr val="00B050"/>
+                <a:solidFill>
+                  <a:srgbClr val="C00000"/>
                 </a:solidFill>
                 <a:latin typeface="Courier New" pitchFamily="49" charset="0"/>
                 <a:cs typeface="Courier New" pitchFamily="49" charset="0"/>
               </a:rPr>
               <a:t>&gt;</a:t>
             </a:r>
-            <a:r>
-              <a:rPr lang="en-US" sz="1800" b="1" dirty="0" smtClean="0">
-                <a:latin typeface="Courier New" pitchFamily="49" charset="0"/>
-                <a:cs typeface="Courier New" pitchFamily="49" charset="0"/>
-              </a:rPr>
-              <a:t> …more stuff…</a:t>
-            </a:r>
-            <a:r>
-              <a:rPr lang="en-US" sz="1800" b="1" dirty="0" smtClean="0">
-                <a:solidFill>
-                  <a:srgbClr val="00B050"/>
-                </a:solidFill>
-                <a:latin typeface="Courier New" pitchFamily="49" charset="0"/>
-                <a:cs typeface="Courier New" pitchFamily="49" charset="0"/>
-              </a:rPr>
-              <a:t>&lt;/</a:t>
-            </a:r>
-            <a:r>
-              <a:rPr lang="en-US" sz="1800" b="1" dirty="0" err="1" smtClean="0">
-                <a:solidFill>
-                  <a:srgbClr val="00B050"/>
-                </a:solidFill>
-                <a:latin typeface="Courier New" pitchFamily="49" charset="0"/>
-                <a:cs typeface="Courier New" pitchFamily="49" charset="0"/>
-              </a:rPr>
-              <a:t>li</a:t>
-            </a:r>
-            <a:r>
-              <a:rPr lang="en-US" sz="1800" b="1" dirty="0" smtClean="0">
-                <a:solidFill>
-                  <a:srgbClr val="00B050"/>
-                </a:solidFill>
-                <a:latin typeface="Courier New" pitchFamily="49" charset="0"/>
-                <a:cs typeface="Courier New" pitchFamily="49" charset="0"/>
-              </a:rPr>
-              <a:t>&gt;</a:t>
-            </a:r>
-            <a:endParaRPr lang="en-US" sz="1800" b="1" dirty="0" smtClean="0">
-              <a:solidFill>
-                <a:srgbClr val="00B050"/>
-              </a:solidFill>
-              <a:latin typeface="Courier New" pitchFamily="49" charset="0"/>
-              <a:cs typeface="Courier New" pitchFamily="49" charset="0"/>
-            </a:endParaRPr>
-          </a:p>
-          <a:p>
-            <a:pPr>
-              <a:buNone/>
-            </a:pPr>
-            <a:r>
-              <a:rPr lang="en-US" sz="1800" b="1" dirty="0" smtClean="0">
-                <a:solidFill>
-                  <a:srgbClr val="C00000"/>
-                </a:solidFill>
-                <a:latin typeface="Courier New" pitchFamily="49" charset="0"/>
-                <a:cs typeface="Courier New" pitchFamily="49" charset="0"/>
-              </a:rPr>
-              <a:t>&lt;/</a:t>
-            </a:r>
-            <a:r>
-              <a:rPr lang="en-US" sz="1800" b="1" dirty="0" err="1" smtClean="0">
-                <a:solidFill>
-                  <a:srgbClr val="C00000"/>
-                </a:solidFill>
-                <a:latin typeface="Courier New" pitchFamily="49" charset="0"/>
-                <a:cs typeface="Courier New" pitchFamily="49" charset="0"/>
-              </a:rPr>
-              <a:t>u</a:t>
-            </a:r>
-            <a:r>
-              <a:rPr lang="en-US" sz="1800" b="1" dirty="0" err="1" smtClean="0">
-                <a:solidFill>
-                  <a:srgbClr val="C00000"/>
-                </a:solidFill>
-                <a:latin typeface="Courier New" pitchFamily="49" charset="0"/>
-                <a:cs typeface="Courier New" pitchFamily="49" charset="0"/>
-              </a:rPr>
-              <a:t>l</a:t>
-            </a:r>
-            <a:r>
-              <a:rPr lang="en-US" sz="1800" b="1" dirty="0" smtClean="0">
-                <a:solidFill>
-                  <a:srgbClr val="C00000"/>
-                </a:solidFill>
-                <a:latin typeface="Courier New" pitchFamily="49" charset="0"/>
-                <a:cs typeface="Courier New" pitchFamily="49" charset="0"/>
-              </a:rPr>
-              <a:t>&gt;</a:t>
-            </a:r>
-            <a:endParaRPr lang="en-US" sz="1800" b="1" dirty="0" smtClean="0">
-              <a:solidFill>
-                <a:srgbClr val="C00000"/>
-              </a:solidFill>
-              <a:latin typeface="Courier New" pitchFamily="49" charset="0"/>
-              <a:cs typeface="Courier New" pitchFamily="49" charset="0"/>
-            </a:endParaRPr>
           </a:p>
           <a:p>
             <a:pPr>
@@ -6157,13 +6229,17 @@
         <p:spPr/>
         <p:txBody>
           <a:bodyPr>
-            <a:normAutofit fontScale="55000" lnSpcReduction="20000"/>
+            <a:normAutofit/>
           </a:bodyPr>
           <a:lstStyle/>
           <a:p>
             <a:r>
               <a:rPr lang="en-US" sz="2400" dirty="0" smtClean="0"/>
-              <a:t>In your cookie-recipe.html </a:t>
+              <a:t>In </a:t>
+            </a:r>
+            <a:r>
+              <a:rPr lang="en-US" sz="2400" dirty="0" smtClean="0"/>
+              <a:t>you’re my-resume.html file </a:t>
             </a:r>
             <a:r>
               <a:rPr lang="en-US" sz="2400" dirty="0" smtClean="0"/>
@@ -6182,14 +6258,17 @@
                 <a:latin typeface="Courier New" pitchFamily="49" charset="0"/>
                 <a:cs typeface="Courier New" pitchFamily="49" charset="0"/>
               </a:rPr>
-              <a:t>&lt;h3&gt;</a:t>
+              <a:t>&lt;</a:t>
             </a:r>
             <a:r>
               <a:rPr lang="en-US" sz="2300" b="1" dirty="0" smtClean="0">
-                <a:latin typeface="Courier New" pitchFamily="49" charset="0"/>
-                <a:cs typeface="Courier New" pitchFamily="49" charset="0"/>
-              </a:rPr>
-              <a:t>Directions</a:t>
+                <a:solidFill>
+                  <a:srgbClr val="0070C0"/>
+                </a:solidFill>
+                <a:latin typeface="Courier New" pitchFamily="49" charset="0"/>
+                <a:cs typeface="Courier New" pitchFamily="49" charset="0"/>
+              </a:rPr>
+              <a:t>h3&gt;Goals&lt;/</a:t>
             </a:r>
             <a:r>
               <a:rPr lang="en-US" sz="2300" b="1" dirty="0" smtClean="0">
@@ -6199,15 +6278,8 @@
                 <a:latin typeface="Courier New" pitchFamily="49" charset="0"/>
                 <a:cs typeface="Courier New" pitchFamily="49" charset="0"/>
               </a:rPr>
-              <a:t>&lt;/h3&gt;</a:t>
-            </a:r>
-            <a:endParaRPr lang="en-US" sz="2300" b="1" dirty="0" smtClean="0">
-              <a:solidFill>
-                <a:srgbClr val="0070C0"/>
-              </a:solidFill>
-              <a:latin typeface="Courier New" pitchFamily="49" charset="0"/>
-              <a:cs typeface="Courier New" pitchFamily="49" charset="0"/>
-            </a:endParaRPr>
+              <a:t>h3&gt;</a:t>
+            </a:r>
           </a:p>
           <a:p>
             <a:pPr>
@@ -6231,35 +6303,97 @@
                 <a:latin typeface="Courier New" pitchFamily="49" charset="0"/>
                 <a:cs typeface="Courier New" pitchFamily="49" charset="0"/>
               </a:rPr>
-              <a:t>o</a:t>
+              <a:t>ol</a:t>
+            </a:r>
+            <a:r>
+              <a:rPr lang="en-US" sz="2300" b="1" dirty="0" smtClean="0">
+                <a:solidFill>
+                  <a:srgbClr val="FF0000"/>
+                </a:solidFill>
+                <a:latin typeface="Courier New" pitchFamily="49" charset="0"/>
+                <a:cs typeface="Courier New" pitchFamily="49" charset="0"/>
+              </a:rPr>
+              <a:t>&gt;</a:t>
+            </a:r>
+          </a:p>
+          <a:p>
+            <a:pPr>
+              <a:buNone/>
+            </a:pPr>
+            <a:r>
+              <a:rPr lang="en-US" sz="2300" b="1" dirty="0" smtClean="0">
+                <a:latin typeface="Courier New" pitchFamily="49" charset="0"/>
+                <a:cs typeface="Courier New" pitchFamily="49" charset="0"/>
+              </a:rPr>
+              <a:t>    </a:t>
+            </a:r>
+            <a:r>
+              <a:rPr lang="en-US" sz="2300" b="1" dirty="0" smtClean="0">
+                <a:solidFill>
+                  <a:srgbClr val="00B050"/>
+                </a:solidFill>
+                <a:latin typeface="Courier New" pitchFamily="49" charset="0"/>
+                <a:cs typeface="Courier New" pitchFamily="49" charset="0"/>
+              </a:rPr>
+              <a:t>&lt;</a:t>
             </a:r>
             <a:r>
               <a:rPr lang="en-US" sz="2300" b="1" dirty="0" err="1" smtClean="0">
                 <a:solidFill>
-                  <a:srgbClr val="FF0000"/>
-                </a:solidFill>
-                <a:latin typeface="Courier New" pitchFamily="49" charset="0"/>
-                <a:cs typeface="Courier New" pitchFamily="49" charset="0"/>
-              </a:rPr>
-              <a:t>l</a:t>
+                  <a:srgbClr val="00B050"/>
+                </a:solidFill>
+                <a:latin typeface="Courier New" pitchFamily="49" charset="0"/>
+                <a:cs typeface="Courier New" pitchFamily="49" charset="0"/>
+              </a:rPr>
+              <a:t>li</a:t>
             </a:r>
             <a:r>
               <a:rPr lang="en-US" sz="2300" b="1" dirty="0" smtClean="0">
                 <a:solidFill>
-                  <a:srgbClr val="FF0000"/>
+                  <a:srgbClr val="00B050"/>
                 </a:solidFill>
                 <a:latin typeface="Courier New" pitchFamily="49" charset="0"/>
                 <a:cs typeface="Courier New" pitchFamily="49" charset="0"/>
               </a:rPr>
               <a:t>&gt;</a:t>
             </a:r>
-            <a:endParaRPr lang="en-US" sz="2300" b="1" dirty="0" smtClean="0">
-              <a:solidFill>
-                <a:srgbClr val="FF0000"/>
-              </a:solidFill>
-              <a:latin typeface="Courier New" pitchFamily="49" charset="0"/>
-              <a:cs typeface="Courier New" pitchFamily="49" charset="0"/>
-            </a:endParaRPr>
+            <a:r>
+              <a:rPr lang="en-US" sz="2300" b="1" dirty="0" smtClean="0">
+                <a:latin typeface="Courier New" pitchFamily="49" charset="0"/>
+                <a:cs typeface="Courier New" pitchFamily="49" charset="0"/>
+              </a:rPr>
+              <a:t>Get Hired On</a:t>
+            </a:r>
+            <a:r>
+              <a:rPr lang="en-US" sz="2300" b="1" dirty="0" smtClean="0">
+                <a:solidFill>
+                  <a:srgbClr val="00B050"/>
+                </a:solidFill>
+                <a:latin typeface="Courier New" pitchFamily="49" charset="0"/>
+                <a:cs typeface="Courier New" pitchFamily="49" charset="0"/>
+              </a:rPr>
+              <a:t>&lt;/</a:t>
+            </a:r>
+            <a:r>
+              <a:rPr lang="en-US" sz="2300" b="1" dirty="0" err="1" smtClean="0">
+                <a:solidFill>
+                  <a:srgbClr val="00B050"/>
+                </a:solidFill>
+                <a:latin typeface="Courier New" pitchFamily="49" charset="0"/>
+                <a:cs typeface="Courier New" pitchFamily="49" charset="0"/>
+              </a:rPr>
+              <a:t>li</a:t>
+            </a:r>
+            <a:r>
+              <a:rPr lang="en-US" sz="2300" b="1" dirty="0" smtClean="0">
+                <a:solidFill>
+                  <a:srgbClr val="00B050"/>
+                </a:solidFill>
+                <a:latin typeface="Courier New" pitchFamily="49" charset="0"/>
+                <a:cs typeface="Courier New" pitchFamily="49" charset="0"/>
+              </a:rPr>
+              <a:t>&gt;</a:t>
+            </a:r>
           </a:p>
           <a:p>
             <a:pPr>
@@ -6270,14 +6404,192 @@
                 <a:latin typeface="Courier New" pitchFamily="49" charset="0"/>
                 <a:cs typeface="Courier New" pitchFamily="49" charset="0"/>
               </a:rPr>
+              <a:t>    </a:t>
+            </a:r>
+            <a:r>
+              <a:rPr lang="en-US" sz="2300" b="1" dirty="0" smtClean="0">
+                <a:solidFill>
+                  <a:srgbClr val="00B050"/>
+                </a:solidFill>
+                <a:latin typeface="Courier New" pitchFamily="49" charset="0"/>
+                <a:cs typeface="Courier New" pitchFamily="49" charset="0"/>
+              </a:rPr>
+              <a:t>&lt;</a:t>
+            </a:r>
+            <a:r>
+              <a:rPr lang="en-US" sz="2300" b="1" dirty="0" err="1" smtClean="0">
+                <a:solidFill>
+                  <a:srgbClr val="00B050"/>
+                </a:solidFill>
+                <a:latin typeface="Courier New" pitchFamily="49" charset="0"/>
+                <a:cs typeface="Courier New" pitchFamily="49" charset="0"/>
+              </a:rPr>
+              <a:t>li</a:t>
+            </a:r>
+            <a:r>
+              <a:rPr lang="en-US" sz="2300" b="1" dirty="0" smtClean="0">
+                <a:solidFill>
+                  <a:srgbClr val="00B050"/>
+                </a:solidFill>
+                <a:latin typeface="Courier New" pitchFamily="49" charset="0"/>
+                <a:cs typeface="Courier New" pitchFamily="49" charset="0"/>
+              </a:rPr>
+              <a:t>&gt;</a:t>
+            </a:r>
+            <a:r>
+              <a:rPr lang="en-US" sz="2300" b="1" dirty="0" smtClean="0">
+                <a:latin typeface="Courier New" pitchFamily="49" charset="0"/>
+                <a:cs typeface="Courier New" pitchFamily="49" charset="0"/>
+              </a:rPr>
+              <a:t>Get Promoted to Management</a:t>
+            </a:r>
+            <a:r>
+              <a:rPr lang="en-US" sz="2300" b="1" dirty="0" smtClean="0">
+                <a:solidFill>
+                  <a:srgbClr val="00B050"/>
+                </a:solidFill>
+                <a:latin typeface="Courier New" pitchFamily="49" charset="0"/>
+                <a:cs typeface="Courier New" pitchFamily="49" charset="0"/>
+              </a:rPr>
+              <a:t>&lt;/</a:t>
+            </a:r>
+            <a:r>
+              <a:rPr lang="en-US" sz="2300" b="1" dirty="0" err="1" smtClean="0">
+                <a:solidFill>
+                  <a:srgbClr val="00B050"/>
+                </a:solidFill>
+                <a:latin typeface="Courier New" pitchFamily="49" charset="0"/>
+                <a:cs typeface="Courier New" pitchFamily="49" charset="0"/>
+              </a:rPr>
+              <a:t>li</a:t>
+            </a:r>
+            <a:r>
+              <a:rPr lang="en-US" sz="2300" b="1" dirty="0" smtClean="0">
+                <a:solidFill>
+                  <a:srgbClr val="00B050"/>
+                </a:solidFill>
+                <a:latin typeface="Courier New" pitchFamily="49" charset="0"/>
+                <a:cs typeface="Courier New" pitchFamily="49" charset="0"/>
+              </a:rPr>
+              <a:t>&gt;</a:t>
+            </a:r>
+          </a:p>
+          <a:p>
+            <a:pPr>
+              <a:buNone/>
+            </a:pPr>
+            <a:r>
+              <a:rPr lang="en-US" sz="2300" b="1" dirty="0" smtClean="0">
+                <a:latin typeface="Courier New" pitchFamily="49" charset="0"/>
+                <a:cs typeface="Courier New" pitchFamily="49" charset="0"/>
+              </a:rPr>
+              <a:t>    </a:t>
+            </a:r>
+            <a:r>
+              <a:rPr lang="en-US" sz="2300" b="1" dirty="0" smtClean="0">
+                <a:solidFill>
+                  <a:srgbClr val="00B050"/>
+                </a:solidFill>
+                <a:latin typeface="Courier New" pitchFamily="49" charset="0"/>
+                <a:cs typeface="Courier New" pitchFamily="49" charset="0"/>
+              </a:rPr>
+              <a:t>&lt;</a:t>
+            </a:r>
+            <a:r>
+              <a:rPr lang="en-US" sz="2300" b="1" dirty="0" err="1" smtClean="0">
+                <a:solidFill>
+                  <a:srgbClr val="00B050"/>
+                </a:solidFill>
+                <a:latin typeface="Courier New" pitchFamily="49" charset="0"/>
+                <a:cs typeface="Courier New" pitchFamily="49" charset="0"/>
+              </a:rPr>
+              <a:t>li</a:t>
+            </a:r>
+            <a:r>
+              <a:rPr lang="en-US" sz="2300" b="1" dirty="0" smtClean="0">
+                <a:solidFill>
+                  <a:srgbClr val="00B050"/>
+                </a:solidFill>
+                <a:latin typeface="Courier New" pitchFamily="49" charset="0"/>
+                <a:cs typeface="Courier New" pitchFamily="49" charset="0"/>
+              </a:rPr>
+              <a:t>&gt;</a:t>
+            </a:r>
+            <a:r>
+              <a:rPr lang="en-US" sz="2300" b="1" dirty="0" smtClean="0">
+                <a:latin typeface="Courier New" pitchFamily="49" charset="0"/>
+                <a:cs typeface="Courier New" pitchFamily="49" charset="0"/>
+              </a:rPr>
+              <a:t>Get Promoted to CEO</a:t>
+            </a:r>
+            <a:r>
+              <a:rPr lang="en-US" sz="2300" b="1" dirty="0" smtClean="0">
+                <a:solidFill>
+                  <a:srgbClr val="00B050"/>
+                </a:solidFill>
+                <a:latin typeface="Courier New" pitchFamily="49" charset="0"/>
+                <a:cs typeface="Courier New" pitchFamily="49" charset="0"/>
+              </a:rPr>
+              <a:t>&lt;/</a:t>
+            </a:r>
+            <a:r>
+              <a:rPr lang="en-US" sz="2300" b="1" dirty="0" err="1" smtClean="0">
+                <a:solidFill>
+                  <a:srgbClr val="00B050"/>
+                </a:solidFill>
+                <a:latin typeface="Courier New" pitchFamily="49" charset="0"/>
+                <a:cs typeface="Courier New" pitchFamily="49" charset="0"/>
+              </a:rPr>
+              <a:t>li</a:t>
+            </a:r>
+            <a:r>
+              <a:rPr lang="en-US" sz="2300" b="1" dirty="0" smtClean="0">
+                <a:solidFill>
+                  <a:srgbClr val="00B050"/>
+                </a:solidFill>
+                <a:latin typeface="Courier New" pitchFamily="49" charset="0"/>
+                <a:cs typeface="Courier New" pitchFamily="49" charset="0"/>
+              </a:rPr>
+              <a:t>&gt;</a:t>
+            </a:r>
+          </a:p>
+          <a:p>
+            <a:pPr>
+              <a:buNone/>
+            </a:pPr>
+            <a:r>
+              <a:rPr lang="en-US" sz="2300" b="1" dirty="0" smtClean="0">
+                <a:latin typeface="Courier New" pitchFamily="49" charset="0"/>
+                <a:cs typeface="Courier New" pitchFamily="49" charset="0"/>
+              </a:rPr>
+              <a:t> </a:t>
+            </a:r>
+            <a:r>
+              <a:rPr lang="en-US" sz="2300" b="1" dirty="0" smtClean="0">
+                <a:latin typeface="Courier New" pitchFamily="49" charset="0"/>
+                <a:cs typeface="Courier New" pitchFamily="49" charset="0"/>
+              </a:rPr>
               <a:t>   </a:t>
             </a:r>
             <a:r>
               <a:rPr lang="en-US" sz="2300" b="1" dirty="0" smtClean="0">
-                <a:latin typeface="Courier New" pitchFamily="49" charset="0"/>
-                <a:cs typeface="Courier New" pitchFamily="49" charset="0"/>
-              </a:rPr>
-              <a:t> </a:t>
+                <a:solidFill>
+                  <a:srgbClr val="00B050"/>
+                </a:solidFill>
+                <a:latin typeface="Courier New" pitchFamily="49" charset="0"/>
+                <a:cs typeface="Courier New" pitchFamily="49" charset="0"/>
+              </a:rPr>
+              <a:t>&lt;</a:t>
+            </a:r>
+            <a:r>
+              <a:rPr lang="en-US" sz="2300" b="1" dirty="0" err="1" smtClean="0">
+                <a:solidFill>
+                  <a:srgbClr val="00B050"/>
+                </a:solidFill>
+                <a:latin typeface="Courier New" pitchFamily="49" charset="0"/>
+                <a:cs typeface="Courier New" pitchFamily="49" charset="0"/>
+              </a:rPr>
+              <a:t>li</a:t>
             </a:r>
             <a:r>
               <a:rPr lang="en-US" sz="2300" b="1" dirty="0" smtClean="0">
@@ -6287,541 +6599,14 @@
                 <a:latin typeface="Courier New" pitchFamily="49" charset="0"/>
                 <a:cs typeface="Courier New" pitchFamily="49" charset="0"/>
               </a:rPr>
-              <a:t>&lt;</a:t>
-            </a:r>
-            <a:r>
-              <a:rPr lang="en-US" sz="2300" b="1" dirty="0" err="1" smtClean="0">
-                <a:solidFill>
-                  <a:srgbClr val="00B050"/>
-                </a:solidFill>
-                <a:latin typeface="Courier New" pitchFamily="49" charset="0"/>
-                <a:cs typeface="Courier New" pitchFamily="49" charset="0"/>
-              </a:rPr>
-              <a:t>li</a:t>
+              <a:t>&gt;</a:t>
             </a:r>
             <a:r>
               <a:rPr lang="en-US" sz="2300" b="1" dirty="0" smtClean="0">
-                <a:solidFill>
-                  <a:srgbClr val="00B050"/>
-                </a:solidFill>
-                <a:latin typeface="Courier New" pitchFamily="49" charset="0"/>
-                <a:cs typeface="Courier New" pitchFamily="49" charset="0"/>
-              </a:rPr>
-              <a:t>&gt;</a:t>
-            </a:r>
-            <a:r>
-              <a:rPr lang="en-US" sz="2300" b="1" dirty="0" smtClean="0">
-                <a:latin typeface="Courier New" pitchFamily="49" charset="0"/>
-                <a:cs typeface="Courier New" pitchFamily="49" charset="0"/>
-              </a:rPr>
-              <a:t>&lt;p&gt;Pre-heat oven to 350 degrees F&lt;/p&gt;</a:t>
-            </a:r>
-            <a:r>
-              <a:rPr lang="en-US" sz="2300" b="1" dirty="0" smtClean="0">
-                <a:solidFill>
-                  <a:srgbClr val="00B050"/>
-                </a:solidFill>
-                <a:latin typeface="Courier New" pitchFamily="49" charset="0"/>
-                <a:cs typeface="Courier New" pitchFamily="49" charset="0"/>
-              </a:rPr>
-              <a:t>&lt;/</a:t>
-            </a:r>
-            <a:r>
-              <a:rPr lang="en-US" sz="2300" b="1" dirty="0" err="1" smtClean="0">
-                <a:solidFill>
-                  <a:srgbClr val="00B050"/>
-                </a:solidFill>
-                <a:latin typeface="Courier New" pitchFamily="49" charset="0"/>
-                <a:cs typeface="Courier New" pitchFamily="49" charset="0"/>
-              </a:rPr>
-              <a:t>li</a:t>
-            </a:r>
-            <a:r>
-              <a:rPr lang="en-US" sz="2300" b="1" dirty="0" smtClean="0">
-                <a:solidFill>
-                  <a:srgbClr val="00B050"/>
-                </a:solidFill>
-                <a:latin typeface="Courier New" pitchFamily="49" charset="0"/>
-                <a:cs typeface="Courier New" pitchFamily="49" charset="0"/>
-              </a:rPr>
-              <a:t>&gt;</a:t>
-            </a:r>
-          </a:p>
-          <a:p>
-            <a:pPr>
-              <a:buNone/>
-            </a:pPr>
-            <a:r>
-              <a:rPr lang="en-US" sz="2300" b="1" dirty="0" smtClean="0">
-                <a:latin typeface="Courier New" pitchFamily="49" charset="0"/>
-                <a:cs typeface="Courier New" pitchFamily="49" charset="0"/>
-              </a:rPr>
-              <a:t>   </a:t>
-            </a:r>
-            <a:r>
-              <a:rPr lang="en-US" sz="2300" b="1" dirty="0" smtClean="0">
-                <a:latin typeface="Courier New" pitchFamily="49" charset="0"/>
-                <a:cs typeface="Courier New" pitchFamily="49" charset="0"/>
-              </a:rPr>
-              <a:t> </a:t>
-            </a:r>
-            <a:r>
-              <a:rPr lang="en-US" sz="2300" b="1" dirty="0" smtClean="0">
-                <a:solidFill>
-                  <a:srgbClr val="00B050"/>
-                </a:solidFill>
-                <a:latin typeface="Courier New" pitchFamily="49" charset="0"/>
-                <a:cs typeface="Courier New" pitchFamily="49" charset="0"/>
-              </a:rPr>
-              <a:t>&lt;</a:t>
-            </a:r>
-            <a:r>
-              <a:rPr lang="en-US" sz="2300" b="1" dirty="0" err="1" smtClean="0">
-                <a:solidFill>
-                  <a:srgbClr val="00B050"/>
-                </a:solidFill>
-                <a:latin typeface="Courier New" pitchFamily="49" charset="0"/>
-                <a:cs typeface="Courier New" pitchFamily="49" charset="0"/>
-              </a:rPr>
-              <a:t>li</a:t>
-            </a:r>
-            <a:r>
-              <a:rPr lang="en-US" sz="2300" b="1" dirty="0" smtClean="0">
-                <a:solidFill>
-                  <a:srgbClr val="00B050"/>
-                </a:solidFill>
-                <a:latin typeface="Courier New" pitchFamily="49" charset="0"/>
-                <a:cs typeface="Courier New" pitchFamily="49" charset="0"/>
-              </a:rPr>
-              <a:t>&gt;</a:t>
-            </a:r>
-          </a:p>
-          <a:p>
-            <a:pPr>
-              <a:buNone/>
-            </a:pPr>
-            <a:r>
-              <a:rPr lang="en-US" sz="2300" b="1" dirty="0" smtClean="0">
-                <a:latin typeface="Courier New" pitchFamily="49" charset="0"/>
-                <a:cs typeface="Courier New" pitchFamily="49" charset="0"/>
-              </a:rPr>
-              <a:t> </a:t>
-            </a:r>
-            <a:r>
-              <a:rPr lang="en-US" sz="2300" b="1" dirty="0" smtClean="0">
-                <a:latin typeface="Courier New" pitchFamily="49" charset="0"/>
-                <a:cs typeface="Courier New" pitchFamily="49" charset="0"/>
-              </a:rPr>
-              <a:t>      &lt;p&gt;Mix butter, sugar, flower, vanilla and more stuff in a big  </a:t>
-            </a:r>
-          </a:p>
-          <a:p>
-            <a:pPr>
-              <a:buNone/>
-            </a:pPr>
-            <a:r>
-              <a:rPr lang="en-US" sz="2300" b="1" dirty="0" smtClean="0">
-                <a:latin typeface="Courier New" pitchFamily="49" charset="0"/>
-                <a:cs typeface="Courier New" pitchFamily="49" charset="0"/>
-              </a:rPr>
-              <a:t> </a:t>
-            </a:r>
-            <a:r>
-              <a:rPr lang="en-US" sz="2300" b="1" dirty="0" smtClean="0">
-                <a:latin typeface="Courier New" pitchFamily="49" charset="0"/>
-                <a:cs typeface="Courier New" pitchFamily="49" charset="0"/>
-              </a:rPr>
-              <a:t>         bowl.&lt;/</a:t>
-            </a:r>
-            <a:r>
-              <a:rPr lang="en-US" sz="2300" b="1" dirty="0" smtClean="0">
-                <a:latin typeface="Courier New" pitchFamily="49" charset="0"/>
-                <a:cs typeface="Courier New" pitchFamily="49" charset="0"/>
-              </a:rPr>
-              <a:t>p</a:t>
-            </a:r>
-            <a:r>
-              <a:rPr lang="en-US" sz="2300" b="1" dirty="0" smtClean="0">
-                <a:latin typeface="Courier New" pitchFamily="49" charset="0"/>
-                <a:cs typeface="Courier New" pitchFamily="49" charset="0"/>
-              </a:rPr>
-              <a:t>&gt;</a:t>
-            </a:r>
-          </a:p>
-          <a:p>
-            <a:pPr>
-              <a:buNone/>
-            </a:pPr>
-            <a:r>
-              <a:rPr lang="en-US" sz="2300" b="1" dirty="0" smtClean="0">
-                <a:latin typeface="Courier New" pitchFamily="49" charset="0"/>
-                <a:cs typeface="Courier New" pitchFamily="49" charset="0"/>
-              </a:rPr>
-              <a:t> </a:t>
-            </a:r>
-            <a:r>
-              <a:rPr lang="en-US" sz="2300" b="1" dirty="0" smtClean="0">
-                <a:latin typeface="Courier New" pitchFamily="49" charset="0"/>
-                <a:cs typeface="Courier New" pitchFamily="49" charset="0"/>
-              </a:rPr>
-              <a:t>   </a:t>
-            </a:r>
-            <a:r>
-              <a:rPr lang="en-US" sz="2300" b="1" dirty="0" smtClean="0">
-                <a:solidFill>
-                  <a:srgbClr val="00B050"/>
-                </a:solidFill>
-                <a:latin typeface="Courier New" pitchFamily="49" charset="0"/>
-                <a:cs typeface="Courier New" pitchFamily="49" charset="0"/>
-              </a:rPr>
-              <a:t>&lt;/</a:t>
-            </a:r>
-            <a:r>
-              <a:rPr lang="en-US" sz="2300" b="1" dirty="0" err="1" smtClean="0">
-                <a:solidFill>
-                  <a:srgbClr val="00B050"/>
-                </a:solidFill>
-                <a:latin typeface="Courier New" pitchFamily="49" charset="0"/>
-                <a:cs typeface="Courier New" pitchFamily="49" charset="0"/>
-              </a:rPr>
-              <a:t>li</a:t>
-            </a:r>
-            <a:r>
-              <a:rPr lang="en-US" sz="2300" b="1" dirty="0" smtClean="0">
-                <a:solidFill>
-                  <a:srgbClr val="00B050"/>
-                </a:solidFill>
-                <a:latin typeface="Courier New" pitchFamily="49" charset="0"/>
-                <a:cs typeface="Courier New" pitchFamily="49" charset="0"/>
-              </a:rPr>
-              <a:t>&gt;</a:t>
-            </a:r>
-          </a:p>
-          <a:p>
-            <a:pPr>
-              <a:buNone/>
-            </a:pPr>
-            <a:r>
-              <a:rPr lang="en-US" sz="2300" b="1" dirty="0" smtClean="0">
-                <a:latin typeface="Courier New" pitchFamily="49" charset="0"/>
-                <a:cs typeface="Courier New" pitchFamily="49" charset="0"/>
-              </a:rPr>
-              <a:t> </a:t>
-            </a:r>
-            <a:r>
-              <a:rPr lang="en-US" sz="2300" b="1" dirty="0" smtClean="0">
-                <a:latin typeface="Courier New" pitchFamily="49" charset="0"/>
-                <a:cs typeface="Courier New" pitchFamily="49" charset="0"/>
-              </a:rPr>
-              <a:t>   </a:t>
-            </a:r>
-            <a:r>
-              <a:rPr lang="en-US" sz="2300" b="1" dirty="0" smtClean="0">
-                <a:solidFill>
-                  <a:srgbClr val="00B050"/>
-                </a:solidFill>
-                <a:latin typeface="Courier New" pitchFamily="49" charset="0"/>
-                <a:cs typeface="Courier New" pitchFamily="49" charset="0"/>
-              </a:rPr>
-              <a:t>&lt;</a:t>
-            </a:r>
-            <a:r>
-              <a:rPr lang="en-US" sz="2300" b="1" dirty="0" err="1" smtClean="0">
-                <a:solidFill>
-                  <a:srgbClr val="00B050"/>
-                </a:solidFill>
-                <a:latin typeface="Courier New" pitchFamily="49" charset="0"/>
-                <a:cs typeface="Courier New" pitchFamily="49" charset="0"/>
-              </a:rPr>
-              <a:t>li</a:t>
-            </a:r>
-            <a:r>
-              <a:rPr lang="en-US" sz="2300" b="1" dirty="0" smtClean="0">
-                <a:solidFill>
-                  <a:srgbClr val="00B050"/>
-                </a:solidFill>
-                <a:latin typeface="Courier New" pitchFamily="49" charset="0"/>
-                <a:cs typeface="Courier New" pitchFamily="49" charset="0"/>
-              </a:rPr>
-              <a:t>&gt;</a:t>
-            </a:r>
-          </a:p>
-          <a:p>
-            <a:pPr>
-              <a:buNone/>
-            </a:pPr>
-            <a:r>
-              <a:rPr lang="en-US" sz="2300" b="1" dirty="0" smtClean="0">
-                <a:latin typeface="Courier New" pitchFamily="49" charset="0"/>
-                <a:cs typeface="Courier New" pitchFamily="49" charset="0"/>
-              </a:rPr>
-              <a:t> </a:t>
-            </a:r>
-            <a:r>
-              <a:rPr lang="en-US" sz="2300" b="1" dirty="0" smtClean="0">
-                <a:latin typeface="Courier New" pitchFamily="49" charset="0"/>
-                <a:cs typeface="Courier New" pitchFamily="49" charset="0"/>
-              </a:rPr>
-              <a:t>         &lt;p&gt;Bake for about 10 minutes in the oven, or until edges</a:t>
-            </a:r>
-          </a:p>
-          <a:p>
-            <a:pPr>
-              <a:buNone/>
-            </a:pPr>
-            <a:r>
-              <a:rPr lang="en-US" sz="2300" b="1" dirty="0" smtClean="0">
-                <a:latin typeface="Courier New" pitchFamily="49" charset="0"/>
-                <a:cs typeface="Courier New" pitchFamily="49" charset="0"/>
-              </a:rPr>
-              <a:t> </a:t>
-            </a:r>
-            <a:r>
-              <a:rPr lang="en-US" sz="2300" b="1" dirty="0" smtClean="0">
-                <a:latin typeface="Courier New" pitchFamily="49" charset="0"/>
-                <a:cs typeface="Courier New" pitchFamily="49" charset="0"/>
-              </a:rPr>
-              <a:t>               are nicely browned.</a:t>
-            </a:r>
-          </a:p>
-          <a:p>
-            <a:pPr>
-              <a:buNone/>
-            </a:pPr>
-            <a:r>
-              <a:rPr lang="en-US" sz="2300" b="1" dirty="0" smtClean="0">
-                <a:latin typeface="Courier New" pitchFamily="49" charset="0"/>
-                <a:cs typeface="Courier New" pitchFamily="49" charset="0"/>
-              </a:rPr>
-              <a:t> </a:t>
-            </a:r>
-            <a:r>
-              <a:rPr lang="en-US" sz="2300" b="1" dirty="0" smtClean="0">
-                <a:latin typeface="Courier New" pitchFamily="49" charset="0"/>
-                <a:cs typeface="Courier New" pitchFamily="49" charset="0"/>
-              </a:rPr>
-              <a:t>         &lt;/</a:t>
-            </a:r>
-            <a:r>
-              <a:rPr lang="en-US" sz="2300" b="1" dirty="0" smtClean="0">
-                <a:latin typeface="Courier New" pitchFamily="49" charset="0"/>
-                <a:cs typeface="Courier New" pitchFamily="49" charset="0"/>
-              </a:rPr>
-              <a:t>p</a:t>
-            </a:r>
-            <a:r>
-              <a:rPr lang="en-US" sz="2300" b="1" dirty="0" smtClean="0">
-                <a:latin typeface="Courier New" pitchFamily="49" charset="0"/>
-                <a:cs typeface="Courier New" pitchFamily="49" charset="0"/>
-              </a:rPr>
-              <a:t>&gt;</a:t>
-            </a:r>
-          </a:p>
-          <a:p>
-            <a:pPr>
-              <a:buNone/>
-            </a:pPr>
-            <a:r>
-              <a:rPr lang="en-US" sz="2300" b="1" dirty="0" smtClean="0">
-                <a:latin typeface="Courier New" pitchFamily="49" charset="0"/>
-                <a:cs typeface="Courier New" pitchFamily="49" charset="0"/>
-              </a:rPr>
-              <a:t> </a:t>
-            </a:r>
-            <a:r>
-              <a:rPr lang="en-US" sz="2300" b="1" dirty="0" smtClean="0">
-                <a:latin typeface="Courier New" pitchFamily="49" charset="0"/>
-                <a:cs typeface="Courier New" pitchFamily="49" charset="0"/>
-              </a:rPr>
-              <a:t>   </a:t>
-            </a:r>
-            <a:r>
-              <a:rPr lang="en-US" sz="2300" b="1" dirty="0" smtClean="0">
-                <a:solidFill>
-                  <a:srgbClr val="00B050"/>
-                </a:solidFill>
-                <a:latin typeface="Courier New" pitchFamily="49" charset="0"/>
-                <a:cs typeface="Courier New" pitchFamily="49" charset="0"/>
-              </a:rPr>
-              <a:t>&lt;/</a:t>
-            </a:r>
-            <a:r>
-              <a:rPr lang="en-US" sz="2300" b="1" dirty="0" err="1" smtClean="0">
-                <a:solidFill>
-                  <a:srgbClr val="00B050"/>
-                </a:solidFill>
-                <a:latin typeface="Courier New" pitchFamily="49" charset="0"/>
-                <a:cs typeface="Courier New" pitchFamily="49" charset="0"/>
-              </a:rPr>
-              <a:t>li</a:t>
-            </a:r>
-            <a:r>
-              <a:rPr lang="en-US" sz="2300" b="1" dirty="0" smtClean="0">
-                <a:solidFill>
-                  <a:srgbClr val="00B050"/>
-                </a:solidFill>
-                <a:latin typeface="Courier New" pitchFamily="49" charset="0"/>
-                <a:cs typeface="Courier New" pitchFamily="49" charset="0"/>
-              </a:rPr>
-              <a:t>&gt;</a:t>
-            </a:r>
-          </a:p>
-          <a:p>
-            <a:pPr>
-              <a:buNone/>
-            </a:pPr>
-            <a:r>
-              <a:rPr lang="en-US" sz="2300" b="1" dirty="0" smtClean="0">
-                <a:latin typeface="Courier New" pitchFamily="49" charset="0"/>
-                <a:cs typeface="Courier New" pitchFamily="49" charset="0"/>
-              </a:rPr>
-              <a:t> </a:t>
-            </a:r>
-            <a:r>
-              <a:rPr lang="en-US" sz="2300" b="1" dirty="0" smtClean="0">
-                <a:latin typeface="Courier New" pitchFamily="49" charset="0"/>
-                <a:cs typeface="Courier New" pitchFamily="49" charset="0"/>
-              </a:rPr>
-              <a:t>   </a:t>
-            </a:r>
-            <a:r>
-              <a:rPr lang="en-US" sz="2300" b="1" dirty="0" smtClean="0">
-                <a:solidFill>
-                  <a:srgbClr val="00B050"/>
-                </a:solidFill>
-                <a:latin typeface="Courier New" pitchFamily="49" charset="0"/>
-                <a:cs typeface="Courier New" pitchFamily="49" charset="0"/>
-              </a:rPr>
-              <a:t>&lt;</a:t>
-            </a:r>
-            <a:r>
-              <a:rPr lang="en-US" sz="2300" b="1" dirty="0" err="1" smtClean="0">
-                <a:solidFill>
-                  <a:srgbClr val="00B050"/>
-                </a:solidFill>
-                <a:latin typeface="Courier New" pitchFamily="49" charset="0"/>
-                <a:cs typeface="Courier New" pitchFamily="49" charset="0"/>
-              </a:rPr>
-              <a:t>li</a:t>
-            </a:r>
-            <a:r>
-              <a:rPr lang="en-US" sz="2300" b="1" dirty="0" smtClean="0">
-                <a:solidFill>
-                  <a:srgbClr val="00B050"/>
-                </a:solidFill>
-                <a:latin typeface="Courier New" pitchFamily="49" charset="0"/>
-                <a:cs typeface="Courier New" pitchFamily="49" charset="0"/>
-              </a:rPr>
-              <a:t>&gt;</a:t>
-            </a:r>
-          </a:p>
-          <a:p>
-            <a:pPr>
-              <a:buNone/>
-            </a:pPr>
-            <a:r>
-              <a:rPr lang="en-US" sz="2300" b="1" dirty="0" smtClean="0">
-                <a:latin typeface="Courier New" pitchFamily="49" charset="0"/>
-                <a:cs typeface="Courier New" pitchFamily="49" charset="0"/>
-              </a:rPr>
-              <a:t> </a:t>
-            </a:r>
-            <a:r>
-              <a:rPr lang="en-US" sz="2300" b="1" dirty="0" smtClean="0">
-                <a:latin typeface="Courier New" pitchFamily="49" charset="0"/>
-                <a:cs typeface="Courier New" pitchFamily="49" charset="0"/>
-              </a:rPr>
-              <a:t>           &lt;p&gt;</a:t>
-            </a:r>
-          </a:p>
-          <a:p>
-            <a:pPr>
-              <a:buNone/>
-            </a:pPr>
-            <a:r>
-              <a:rPr lang="en-US" sz="2300" b="1" dirty="0" smtClean="0">
-                <a:latin typeface="Courier New" pitchFamily="49" charset="0"/>
-                <a:cs typeface="Courier New" pitchFamily="49" charset="0"/>
-              </a:rPr>
-              <a:t> </a:t>
-            </a:r>
-            <a:r>
-              <a:rPr lang="en-US" sz="2300" b="1" dirty="0" smtClean="0">
-                <a:latin typeface="Courier New" pitchFamily="49" charset="0"/>
-                <a:cs typeface="Courier New" pitchFamily="49" charset="0"/>
-              </a:rPr>
-              <a:t>                 Remove from oven and allow to cool for about</a:t>
-            </a:r>
-          </a:p>
-          <a:p>
-            <a:pPr>
-              <a:buNone/>
-            </a:pPr>
-            <a:r>
-              <a:rPr lang="en-US" sz="2300" b="1" dirty="0" smtClean="0">
-                <a:latin typeface="Courier New" pitchFamily="49" charset="0"/>
-                <a:cs typeface="Courier New" pitchFamily="49" charset="0"/>
-              </a:rPr>
-              <a:t> </a:t>
-            </a:r>
-            <a:r>
-              <a:rPr lang="en-US" sz="2300" b="1" dirty="0" smtClean="0">
-                <a:latin typeface="Courier New" pitchFamily="49" charset="0"/>
-                <a:cs typeface="Courier New" pitchFamily="49" charset="0"/>
-              </a:rPr>
-              <a:t>                 five minutes</a:t>
-            </a:r>
-          </a:p>
-          <a:p>
-            <a:pPr>
-              <a:buNone/>
-            </a:pPr>
-            <a:r>
-              <a:rPr lang="en-US" sz="2300" b="1" dirty="0" smtClean="0">
-                <a:latin typeface="Courier New" pitchFamily="49" charset="0"/>
-                <a:cs typeface="Courier New" pitchFamily="49" charset="0"/>
-              </a:rPr>
-              <a:t> </a:t>
-            </a:r>
-            <a:r>
-              <a:rPr lang="en-US" sz="2300" b="1" dirty="0" smtClean="0">
-                <a:latin typeface="Courier New" pitchFamily="49" charset="0"/>
-                <a:cs typeface="Courier New" pitchFamily="49" charset="0"/>
-              </a:rPr>
-              <a:t>          &lt;/</a:t>
-            </a:r>
-            <a:r>
-              <a:rPr lang="en-US" sz="2300" b="1" dirty="0" smtClean="0">
-                <a:latin typeface="Courier New" pitchFamily="49" charset="0"/>
-                <a:cs typeface="Courier New" pitchFamily="49" charset="0"/>
-              </a:rPr>
-              <a:t>p</a:t>
-            </a:r>
-            <a:r>
-              <a:rPr lang="en-US" sz="2300" b="1" dirty="0" smtClean="0">
-                <a:latin typeface="Courier New" pitchFamily="49" charset="0"/>
-                <a:cs typeface="Courier New" pitchFamily="49" charset="0"/>
-              </a:rPr>
-              <a:t>&gt;</a:t>
-            </a:r>
-          </a:p>
-          <a:p>
-            <a:pPr>
-              <a:buNone/>
-            </a:pPr>
-            <a:r>
-              <a:rPr lang="en-US" sz="2300" b="1" dirty="0" smtClean="0">
-                <a:latin typeface="Courier New" pitchFamily="49" charset="0"/>
-                <a:cs typeface="Courier New" pitchFamily="49" charset="0"/>
-              </a:rPr>
-              <a:t> </a:t>
-            </a:r>
-            <a:r>
-              <a:rPr lang="en-US" sz="2300" b="1" dirty="0" smtClean="0">
-                <a:latin typeface="Courier New" pitchFamily="49" charset="0"/>
-                <a:cs typeface="Courier New" pitchFamily="49" charset="0"/>
-              </a:rPr>
-              <a:t>   </a:t>
+                <a:latin typeface="Courier New" pitchFamily="49" charset="0"/>
+                <a:cs typeface="Courier New" pitchFamily="49" charset="0"/>
+              </a:rPr>
+              <a:t>Take over the world!!</a:t>
             </a:r>
             <a:r>
               <a:rPr lang="en-US" sz="2300" b="1" dirty="0" smtClean="0">
@@ -6895,13 +6680,6 @@
               </a:rPr>
               <a:t>&gt;</a:t>
             </a:r>
-            <a:endParaRPr lang="en-US" sz="2300" b="1" dirty="0" smtClean="0">
-              <a:solidFill>
-                <a:srgbClr val="FF0000"/>
-              </a:solidFill>
-              <a:latin typeface="Courier New" pitchFamily="49" charset="0"/>
-              <a:cs typeface="Courier New" pitchFamily="49" charset="0"/>
-            </a:endParaRPr>
           </a:p>
           <a:p>
             <a:pPr>
@@ -6910,6 +6688,18 @@
             <a:endParaRPr lang="en-US" sz="2000" dirty="0" smtClean="0"/>
           </a:p>
           <a:p>
+            <a:r>
+              <a:rPr lang="en-US" sz="2400" dirty="0" smtClean="0"/>
+              <a:t>Try using &lt;</a:t>
+            </a:r>
+            <a:r>
+              <a:rPr lang="en-US" sz="2400" dirty="0" err="1" smtClean="0"/>
+              <a:t>ol</a:t>
+            </a:r>
+            <a:r>
+              <a:rPr lang="en-US" sz="2400" dirty="0" smtClean="0"/>
+              <a:t> reversed&gt; instead</a:t>
+            </a:r>
             <a:endParaRPr lang="en-US" sz="2400" dirty="0" smtClean="0"/>
           </a:p>
           <a:p>
@@ -7013,17 +6803,7 @@
                 <a:latin typeface="Courier New" pitchFamily="49" charset="0"/>
                 <a:cs typeface="Courier New" pitchFamily="49" charset="0"/>
               </a:rPr>
-              <a:t>&lt;</a:t>
-            </a:r>
-            <a:r>
-              <a:rPr lang="en-US" sz="2000" b="1" dirty="0" smtClean="0">
-                <a:solidFill>
-                  <a:srgbClr val="0070C0"/>
-                </a:solidFill>
-                <a:latin typeface="Courier New" pitchFamily="49" charset="0"/>
-                <a:cs typeface="Courier New" pitchFamily="49" charset="0"/>
-              </a:rPr>
-              <a:t>dl&gt;</a:t>
+              <a:t>&lt;dl&gt;</a:t>
             </a:r>
             <a:r>
               <a:rPr lang="en-US" sz="2000" b="1" dirty="0" smtClean="0">
@@ -7373,13 +7153,6 @@
               </a:rPr>
               <a:t>&lt;/dl&gt;</a:t>
             </a:r>
-            <a:endParaRPr lang="en-US" sz="2000" b="1" dirty="0" smtClean="0">
-              <a:solidFill>
-                <a:srgbClr val="0070C0"/>
-              </a:solidFill>
-              <a:latin typeface="Courier New" pitchFamily="49" charset="0"/>
-              <a:cs typeface="Courier New" pitchFamily="49" charset="0"/>
-            </a:endParaRPr>
           </a:p>
           <a:p>
             <a:pPr>
@@ -7481,7 +7254,6 @@
               <a:rPr lang="en-US" sz="2400" dirty="0" smtClean="0"/>
               <a:t>Create a page called faqs.html and insert the following code</a:t>
             </a:r>
-            <a:endParaRPr lang="en-US" sz="2400" dirty="0" smtClean="0"/>
           </a:p>
           <a:p>
             <a:pPr>
@@ -7493,6 +7265,220 @@
                 <a:cs typeface="Courier New" pitchFamily="49" charset="0"/>
               </a:rPr>
               <a:t>&lt;h3&gt;FAQs&lt;/h3&gt;</a:t>
+            </a:r>
+          </a:p>
+          <a:p>
+            <a:pPr>
+              <a:buNone/>
+            </a:pPr>
+            <a:r>
+              <a:rPr lang="en-US" sz="2300" dirty="0" smtClean="0">
+                <a:latin typeface="Courier New" pitchFamily="49" charset="0"/>
+                <a:cs typeface="Courier New" pitchFamily="49" charset="0"/>
+              </a:rPr>
+              <a:t>&lt;dl&gt;</a:t>
+            </a:r>
+          </a:p>
+          <a:p>
+            <a:pPr>
+              <a:buNone/>
+            </a:pPr>
+            <a:r>
+              <a:rPr lang="en-US" sz="2300" dirty="0" smtClean="0">
+                <a:latin typeface="Courier New" pitchFamily="49" charset="0"/>
+                <a:cs typeface="Courier New" pitchFamily="49" charset="0"/>
+              </a:rPr>
+              <a:t>    &lt;</a:t>
+            </a:r>
+            <a:r>
+              <a:rPr lang="en-US" sz="2300" dirty="0" err="1" smtClean="0">
+                <a:latin typeface="Courier New" pitchFamily="49" charset="0"/>
+                <a:cs typeface="Courier New" pitchFamily="49" charset="0"/>
+              </a:rPr>
+              <a:t>dt</a:t>
+            </a:r>
+            <a:r>
+              <a:rPr lang="en-US" sz="2300" dirty="0" smtClean="0">
+                <a:latin typeface="Courier New" pitchFamily="49" charset="0"/>
+                <a:cs typeface="Courier New" pitchFamily="49" charset="0"/>
+              </a:rPr>
+              <a:t>&gt;Who created this site&lt;/</a:t>
+            </a:r>
+            <a:r>
+              <a:rPr lang="en-US" sz="2300" dirty="0" err="1" smtClean="0">
+                <a:latin typeface="Courier New" pitchFamily="49" charset="0"/>
+                <a:cs typeface="Courier New" pitchFamily="49" charset="0"/>
+              </a:rPr>
+              <a:t>dt</a:t>
+            </a:r>
+            <a:r>
+              <a:rPr lang="en-US" sz="2300" dirty="0" smtClean="0">
+                <a:latin typeface="Courier New" pitchFamily="49" charset="0"/>
+                <a:cs typeface="Courier New" pitchFamily="49" charset="0"/>
+              </a:rPr>
+              <a:t>&gt;</a:t>
+            </a:r>
+          </a:p>
+          <a:p>
+            <a:pPr>
+              <a:buNone/>
+            </a:pPr>
+            <a:r>
+              <a:rPr lang="en-US" sz="2300" dirty="0" smtClean="0">
+                <a:latin typeface="Courier New" pitchFamily="49" charset="0"/>
+                <a:cs typeface="Courier New" pitchFamily="49" charset="0"/>
+              </a:rPr>
+              <a:t>    &lt;</a:t>
+            </a:r>
+            <a:r>
+              <a:rPr lang="en-US" sz="2300" dirty="0" err="1" smtClean="0">
+                <a:latin typeface="Courier New" pitchFamily="49" charset="0"/>
+                <a:cs typeface="Courier New" pitchFamily="49" charset="0"/>
+              </a:rPr>
+              <a:t>dd</a:t>
+            </a:r>
+            <a:r>
+              <a:rPr lang="en-US" sz="2300" dirty="0" smtClean="0">
+                <a:latin typeface="Courier New" pitchFamily="49" charset="0"/>
+                <a:cs typeface="Courier New" pitchFamily="49" charset="0"/>
+              </a:rPr>
+              <a:t>&gt;Why me of course!&lt;/</a:t>
+            </a:r>
+            <a:r>
+              <a:rPr lang="en-US" sz="2300" dirty="0" err="1" smtClean="0">
+                <a:latin typeface="Courier New" pitchFamily="49" charset="0"/>
+                <a:cs typeface="Courier New" pitchFamily="49" charset="0"/>
+              </a:rPr>
+              <a:t>dd</a:t>
+            </a:r>
+            <a:r>
+              <a:rPr lang="en-US" sz="2300" dirty="0" smtClean="0">
+                <a:latin typeface="Courier New" pitchFamily="49" charset="0"/>
+                <a:cs typeface="Courier New" pitchFamily="49" charset="0"/>
+              </a:rPr>
+              <a:t>&gt;</a:t>
+            </a:r>
+          </a:p>
+          <a:p>
+            <a:pPr>
+              <a:buNone/>
+            </a:pPr>
+            <a:r>
+              <a:rPr lang="en-US" sz="2300" dirty="0" smtClean="0">
+                <a:latin typeface="Courier New" pitchFamily="49" charset="0"/>
+                <a:cs typeface="Courier New" pitchFamily="49" charset="0"/>
+              </a:rPr>
+              <a:t>    &lt;</a:t>
+            </a:r>
+            <a:r>
+              <a:rPr lang="en-US" sz="2300" dirty="0" err="1" smtClean="0">
+                <a:latin typeface="Courier New" pitchFamily="49" charset="0"/>
+                <a:cs typeface="Courier New" pitchFamily="49" charset="0"/>
+              </a:rPr>
+              <a:t>dt</a:t>
+            </a:r>
+            <a:r>
+              <a:rPr lang="en-US" sz="2300" dirty="0" smtClean="0">
+                <a:latin typeface="Courier New" pitchFamily="49" charset="0"/>
+                <a:cs typeface="Courier New" pitchFamily="49" charset="0"/>
+              </a:rPr>
+              <a:t>&gt;What’s a good HTML reference&lt;/</a:t>
+            </a:r>
+            <a:r>
+              <a:rPr lang="en-US" sz="2300" dirty="0" err="1" smtClean="0">
+                <a:latin typeface="Courier New" pitchFamily="49" charset="0"/>
+                <a:cs typeface="Courier New" pitchFamily="49" charset="0"/>
+              </a:rPr>
+              <a:t>dt</a:t>
+            </a:r>
+            <a:r>
+              <a:rPr lang="en-US" sz="2300" dirty="0" smtClean="0">
+                <a:latin typeface="Courier New" pitchFamily="49" charset="0"/>
+                <a:cs typeface="Courier New" pitchFamily="49" charset="0"/>
+              </a:rPr>
+              <a:t>&gt;</a:t>
+            </a:r>
+          </a:p>
+          <a:p>
+            <a:pPr>
+              <a:buNone/>
+            </a:pPr>
+            <a:r>
+              <a:rPr lang="en-US" sz="2300" dirty="0" smtClean="0">
+                <a:latin typeface="Courier New" pitchFamily="49" charset="0"/>
+                <a:cs typeface="Courier New" pitchFamily="49" charset="0"/>
+              </a:rPr>
+              <a:t>    &lt;</a:t>
+            </a:r>
+            <a:r>
+              <a:rPr lang="en-US" sz="2300" dirty="0" err="1" smtClean="0">
+                <a:latin typeface="Courier New" pitchFamily="49" charset="0"/>
+                <a:cs typeface="Courier New" pitchFamily="49" charset="0"/>
+              </a:rPr>
+              <a:t>dd</a:t>
+            </a:r>
+            <a:r>
+              <a:rPr lang="en-US" sz="2300" dirty="0" smtClean="0">
+                <a:latin typeface="Courier New" pitchFamily="49" charset="0"/>
+                <a:cs typeface="Courier New" pitchFamily="49" charset="0"/>
+              </a:rPr>
+              <a:t>&gt;</a:t>
+            </a:r>
+          </a:p>
+          <a:p>
+            <a:pPr>
+              <a:buNone/>
+            </a:pPr>
+            <a:r>
+              <a:rPr lang="en-US" sz="2300" dirty="0" smtClean="0">
+                <a:latin typeface="Courier New" pitchFamily="49" charset="0"/>
+                <a:cs typeface="Courier New" pitchFamily="49" charset="0"/>
+              </a:rPr>
+              <a:t>      &lt;a</a:t>
+            </a:r>
+          </a:p>
+          <a:p>
+            <a:pPr>
+              <a:buNone/>
+            </a:pPr>
+            <a:r>
+              <a:rPr lang="en-US" sz="2300" dirty="0" smtClean="0">
+                <a:latin typeface="Courier New" pitchFamily="49" charset="0"/>
+                <a:cs typeface="Courier New" pitchFamily="49" charset="0"/>
+              </a:rPr>
+              <a:t>         </a:t>
+            </a:r>
+            <a:r>
+              <a:rPr lang="en-US" sz="2300" dirty="0" err="1" smtClean="0">
+                <a:latin typeface="Courier New" pitchFamily="49" charset="0"/>
+                <a:cs typeface="Courier New" pitchFamily="49" charset="0"/>
+              </a:rPr>
+              <a:t>href</a:t>
+            </a:r>
+            <a:r>
+              <a:rPr lang="en-US" sz="2300" dirty="0" smtClean="0">
+                <a:latin typeface="Courier New" pitchFamily="49" charset="0"/>
+                <a:cs typeface="Courier New" pitchFamily="49" charset="0"/>
+              </a:rPr>
+              <a:t>=</a:t>
+            </a:r>
+            <a:r>
+              <a:rPr lang="en-US" sz="2300" dirty="0" smtClean="0">
+                <a:latin typeface="Courier New" pitchFamily="49" charset="0"/>
+                <a:cs typeface="Courier New" pitchFamily="49" charset="0"/>
+                <a:hlinkClick r:id="rId2"/>
+              </a:rPr>
+              <a:t>“http://</a:t>
+            </a:r>
+            <a:r>
+              <a:rPr lang="en-US" sz="2400" dirty="0" smtClean="0">
+                <a:hlinkClick r:id="rId2"/>
+              </a:rPr>
+              <a:t>http://www.w3schools.com</a:t>
+            </a:r>
+            <a:r>
+              <a:rPr lang="en-US" sz="2400" dirty="0" smtClean="0"/>
+              <a:t>”</a:t>
             </a:r>
             <a:endParaRPr lang="en-US" sz="2300" dirty="0" smtClean="0">
               <a:latin typeface="Courier New" pitchFamily="49" charset="0"/>
@@ -7508,26 +7494,98 @@
                 <a:latin typeface="Courier New" pitchFamily="49" charset="0"/>
                 <a:cs typeface="Courier New" pitchFamily="49" charset="0"/>
               </a:rPr>
-              <a:t>&lt;</a:t>
-            </a:r>
+              <a:t>      &gt;</a:t>
+            </a:r>
+          </a:p>
+          <a:p>
+            <a:pPr>
+              <a:buNone/>
+            </a:pPr>
             <a:r>
               <a:rPr lang="en-US" sz="2300" dirty="0" smtClean="0">
                 <a:latin typeface="Courier New" pitchFamily="49" charset="0"/>
                 <a:cs typeface="Courier New" pitchFamily="49" charset="0"/>
               </a:rPr>
-              <a:t>dl</a:t>
-            </a:r>
+              <a:t>        w3cschools</a:t>
+            </a:r>
+          </a:p>
+          <a:p>
+            <a:pPr>
+              <a:buNone/>
+            </a:pPr>
             <a:r>
               <a:rPr lang="en-US" sz="2300" dirty="0" smtClean="0">
                 <a:latin typeface="Courier New" pitchFamily="49" charset="0"/>
                 <a:cs typeface="Courier New" pitchFamily="49" charset="0"/>
               </a:rPr>
+              <a:t>      &lt;/a&gt;</a:t>
+            </a:r>
+          </a:p>
+          <a:p>
+            <a:pPr>
+              <a:buNone/>
+            </a:pPr>
+            <a:r>
+              <a:rPr lang="en-US" sz="2300" dirty="0" smtClean="0">
+                <a:latin typeface="Courier New" pitchFamily="49" charset="0"/>
+                <a:cs typeface="Courier New" pitchFamily="49" charset="0"/>
+              </a:rPr>
+              <a:t>    &lt;/</a:t>
+            </a:r>
+            <a:r>
+              <a:rPr lang="en-US" sz="2300" dirty="0" err="1" smtClean="0">
+                <a:latin typeface="Courier New" pitchFamily="49" charset="0"/>
+                <a:cs typeface="Courier New" pitchFamily="49" charset="0"/>
+              </a:rPr>
+              <a:t>dd</a:t>
+            </a:r>
+            <a:r>
+              <a:rPr lang="en-US" sz="2300" dirty="0" smtClean="0">
+                <a:latin typeface="Courier New" pitchFamily="49" charset="0"/>
+                <a:cs typeface="Courier New" pitchFamily="49" charset="0"/>
+              </a:rPr>
+              <a:t>&gt; </a:t>
+            </a:r>
+          </a:p>
+          <a:p>
+            <a:pPr>
+              <a:buNone/>
+            </a:pPr>
+            <a:r>
+              <a:rPr lang="en-US" sz="2300" dirty="0" smtClean="0">
+                <a:latin typeface="Courier New" pitchFamily="49" charset="0"/>
+                <a:cs typeface="Courier New" pitchFamily="49" charset="0"/>
+              </a:rPr>
+              <a:t>    &lt;</a:t>
+            </a:r>
+            <a:r>
+              <a:rPr lang="en-US" sz="2300" dirty="0" err="1" smtClean="0">
+                <a:latin typeface="Courier New" pitchFamily="49" charset="0"/>
+                <a:cs typeface="Courier New" pitchFamily="49" charset="0"/>
+              </a:rPr>
+              <a:t>dt</a:t>
+            </a:r>
+            <a:r>
+              <a:rPr lang="en-US" sz="2300" dirty="0" smtClean="0">
+                <a:latin typeface="Courier New" pitchFamily="49" charset="0"/>
+                <a:cs typeface="Courier New" pitchFamily="49" charset="0"/>
+              </a:rPr>
+              <a:t>&gt;How long does it take to learn HMTL&lt;/</a:t>
+            </a:r>
+            <a:r>
+              <a:rPr lang="en-US" sz="2300" dirty="0" err="1" smtClean="0">
+                <a:latin typeface="Courier New" pitchFamily="49" charset="0"/>
+                <a:cs typeface="Courier New" pitchFamily="49" charset="0"/>
+              </a:rPr>
+              <a:t>dt</a:t>
+            </a:r>
+            <a:r>
+              <a:rPr lang="en-US" sz="2300" dirty="0" smtClean="0">
+                <a:latin typeface="Courier New" pitchFamily="49" charset="0"/>
+                <a:cs typeface="Courier New" pitchFamily="49" charset="0"/>
+              </a:rPr>
               <a:t>&gt;</a:t>
             </a:r>
-            <a:endParaRPr lang="en-US" sz="2300" dirty="0" smtClean="0">
-              <a:latin typeface="Courier New" pitchFamily="49" charset="0"/>
-              <a:cs typeface="Courier New" pitchFamily="49" charset="0"/>
-            </a:endParaRPr>
           </a:p>
           <a:p>
             <a:pPr>
@@ -7538,35 +7596,42 @@
                 <a:latin typeface="Courier New" pitchFamily="49" charset="0"/>
                 <a:cs typeface="Courier New" pitchFamily="49" charset="0"/>
               </a:rPr>
-              <a:t>   </a:t>
+              <a:t>    &lt;</a:t>
+            </a:r>
+            <a:r>
+              <a:rPr lang="en-US" sz="2300" dirty="0" err="1" smtClean="0">
+                <a:latin typeface="Courier New" pitchFamily="49" charset="0"/>
+                <a:cs typeface="Courier New" pitchFamily="49" charset="0"/>
+              </a:rPr>
+              <a:t>dd</a:t>
             </a:r>
             <a:r>
               <a:rPr lang="en-US" sz="2300" dirty="0" smtClean="0">
                 <a:latin typeface="Courier New" pitchFamily="49" charset="0"/>
                 <a:cs typeface="Courier New" pitchFamily="49" charset="0"/>
               </a:rPr>
-              <a:t> &lt;</a:t>
+              <a:t>&gt;&lt;p&gt;Learning the HTML basics can take a </a:t>
             </a:r>
             <a:r>
               <a:rPr lang="en-US" sz="2300" dirty="0" err="1" smtClean="0">
                 <a:latin typeface="Courier New" pitchFamily="49" charset="0"/>
                 <a:cs typeface="Courier New" pitchFamily="49" charset="0"/>
               </a:rPr>
-              <a:t>dt</a:t>
+              <a:t>a</a:t>
             </a:r>
             <a:r>
               <a:rPr lang="en-US" sz="2300" dirty="0" smtClean="0">
                 <a:latin typeface="Courier New" pitchFamily="49" charset="0"/>
                 <a:cs typeface="Courier New" pitchFamily="49" charset="0"/>
               </a:rPr>
-              <a:t>&gt;Who created this site&lt;/</a:t>
+              <a:t> matter of a few hours to a few days. To manage everything else involved in creating web applications can take many years. This is also compounded by the fact that technology is frequently changing&lt;/p&gt;&lt;/</a:t>
             </a:r>
             <a:r>
               <a:rPr lang="en-US" sz="2300" dirty="0" err="1" smtClean="0">
                 <a:latin typeface="Courier New" pitchFamily="49" charset="0"/>
                 <a:cs typeface="Courier New" pitchFamily="49" charset="0"/>
               </a:rPr>
-              <a:t>dt</a:t>
+              <a:t>dd</a:t>
             </a:r>
             <a:r>
               <a:rPr lang="en-US" sz="2300" dirty="0" smtClean="0">
@@ -7575,10 +7640,6 @@
               </a:rPr>
               <a:t>&gt;</a:t>
             </a:r>
-            <a:endParaRPr lang="en-US" sz="2300" dirty="0" smtClean="0">
-              <a:latin typeface="Courier New" pitchFamily="49" charset="0"/>
-              <a:cs typeface="Courier New" pitchFamily="49" charset="0"/>
-            </a:endParaRPr>
           </a:p>
           <a:p>
             <a:pPr>
@@ -7589,418 +7650,8 @@
                 <a:latin typeface="Courier New" pitchFamily="49" charset="0"/>
                 <a:cs typeface="Courier New" pitchFamily="49" charset="0"/>
               </a:rPr>
-              <a:t>   </a:t>
-            </a:r>
-            <a:r>
-              <a:rPr lang="en-US" sz="2300" dirty="0" smtClean="0">
-                <a:latin typeface="Courier New" pitchFamily="49" charset="0"/>
-                <a:cs typeface="Courier New" pitchFamily="49" charset="0"/>
-              </a:rPr>
-              <a:t> </a:t>
-            </a:r>
-            <a:r>
-              <a:rPr lang="en-US" sz="2300" dirty="0" smtClean="0">
-                <a:latin typeface="Courier New" pitchFamily="49" charset="0"/>
-                <a:cs typeface="Courier New" pitchFamily="49" charset="0"/>
-              </a:rPr>
-              <a:t>&lt;</a:t>
-            </a:r>
-            <a:r>
-              <a:rPr lang="en-US" sz="2300" dirty="0" err="1" smtClean="0">
-                <a:latin typeface="Courier New" pitchFamily="49" charset="0"/>
-                <a:cs typeface="Courier New" pitchFamily="49" charset="0"/>
-              </a:rPr>
-              <a:t>dd</a:t>
-            </a:r>
-            <a:r>
-              <a:rPr lang="en-US" sz="2300" dirty="0" smtClean="0">
-                <a:latin typeface="Courier New" pitchFamily="49" charset="0"/>
-                <a:cs typeface="Courier New" pitchFamily="49" charset="0"/>
-              </a:rPr>
-              <a:t>&gt;Why me of course!&lt;/</a:t>
-            </a:r>
-            <a:r>
-              <a:rPr lang="en-US" sz="2300" dirty="0" err="1" smtClean="0">
-                <a:latin typeface="Courier New" pitchFamily="49" charset="0"/>
-                <a:cs typeface="Courier New" pitchFamily="49" charset="0"/>
-              </a:rPr>
-              <a:t>dd</a:t>
-            </a:r>
-            <a:r>
-              <a:rPr lang="en-US" sz="2300" dirty="0" smtClean="0">
-                <a:latin typeface="Courier New" pitchFamily="49" charset="0"/>
-                <a:cs typeface="Courier New" pitchFamily="49" charset="0"/>
-              </a:rPr>
-              <a:t>&gt;</a:t>
-            </a:r>
-          </a:p>
-          <a:p>
-            <a:pPr>
-              <a:buNone/>
-            </a:pPr>
-            <a:r>
-              <a:rPr lang="en-US" sz="2300" dirty="0" smtClean="0">
-                <a:latin typeface="Courier New" pitchFamily="49" charset="0"/>
-                <a:cs typeface="Courier New" pitchFamily="49" charset="0"/>
-              </a:rPr>
-              <a:t> </a:t>
-            </a:r>
-            <a:r>
-              <a:rPr lang="en-US" sz="2300" dirty="0" smtClean="0">
-                <a:latin typeface="Courier New" pitchFamily="49" charset="0"/>
-                <a:cs typeface="Courier New" pitchFamily="49" charset="0"/>
-              </a:rPr>
-              <a:t>   &lt;</a:t>
-            </a:r>
-            <a:r>
-              <a:rPr lang="en-US" sz="2300" dirty="0" err="1" smtClean="0">
-                <a:latin typeface="Courier New" pitchFamily="49" charset="0"/>
-                <a:cs typeface="Courier New" pitchFamily="49" charset="0"/>
-              </a:rPr>
-              <a:t>dt</a:t>
-            </a:r>
-            <a:r>
-              <a:rPr lang="en-US" sz="2300" dirty="0" smtClean="0">
-                <a:latin typeface="Courier New" pitchFamily="49" charset="0"/>
-                <a:cs typeface="Courier New" pitchFamily="49" charset="0"/>
-              </a:rPr>
-              <a:t>&gt;What’s a good HTML reference&lt;/</a:t>
-            </a:r>
-            <a:r>
-              <a:rPr lang="en-US" sz="2300" dirty="0" err="1" smtClean="0">
-                <a:latin typeface="Courier New" pitchFamily="49" charset="0"/>
-                <a:cs typeface="Courier New" pitchFamily="49" charset="0"/>
-              </a:rPr>
-              <a:t>dt</a:t>
-            </a:r>
-            <a:r>
-              <a:rPr lang="en-US" sz="2300" dirty="0" smtClean="0">
-                <a:latin typeface="Courier New" pitchFamily="49" charset="0"/>
-                <a:cs typeface="Courier New" pitchFamily="49" charset="0"/>
-              </a:rPr>
-              <a:t>&gt;</a:t>
-            </a:r>
-          </a:p>
-          <a:p>
-            <a:pPr>
-              <a:buNone/>
-            </a:pPr>
-            <a:r>
-              <a:rPr lang="en-US" sz="2300" dirty="0" smtClean="0">
-                <a:latin typeface="Courier New" pitchFamily="49" charset="0"/>
-                <a:cs typeface="Courier New" pitchFamily="49" charset="0"/>
-              </a:rPr>
-              <a:t>    &lt;</a:t>
-            </a:r>
-            <a:r>
-              <a:rPr lang="en-US" sz="2300" dirty="0" err="1" smtClean="0">
-                <a:latin typeface="Courier New" pitchFamily="49" charset="0"/>
-                <a:cs typeface="Courier New" pitchFamily="49" charset="0"/>
-              </a:rPr>
-              <a:t>dd</a:t>
-            </a:r>
-            <a:r>
-              <a:rPr lang="en-US" sz="2300" dirty="0" smtClean="0">
-                <a:latin typeface="Courier New" pitchFamily="49" charset="0"/>
-                <a:cs typeface="Courier New" pitchFamily="49" charset="0"/>
-              </a:rPr>
-              <a:t>&gt;</a:t>
-            </a:r>
-          </a:p>
-          <a:p>
-            <a:pPr>
-              <a:buNone/>
-            </a:pPr>
-            <a:r>
-              <a:rPr lang="en-US" sz="2300" dirty="0" smtClean="0">
-                <a:latin typeface="Courier New" pitchFamily="49" charset="0"/>
-                <a:cs typeface="Courier New" pitchFamily="49" charset="0"/>
-              </a:rPr>
-              <a:t> </a:t>
-            </a:r>
-            <a:r>
-              <a:rPr lang="en-US" sz="2300" dirty="0" smtClean="0">
-                <a:latin typeface="Courier New" pitchFamily="49" charset="0"/>
-                <a:cs typeface="Courier New" pitchFamily="49" charset="0"/>
-              </a:rPr>
-              <a:t>     &lt;a</a:t>
-            </a:r>
-          </a:p>
-          <a:p>
-            <a:pPr>
-              <a:buNone/>
-            </a:pPr>
-            <a:r>
-              <a:rPr lang="en-US" sz="2300" dirty="0" smtClean="0">
-                <a:latin typeface="Courier New" pitchFamily="49" charset="0"/>
-                <a:cs typeface="Courier New" pitchFamily="49" charset="0"/>
-              </a:rPr>
-              <a:t> </a:t>
-            </a:r>
-            <a:r>
-              <a:rPr lang="en-US" sz="2300" dirty="0" smtClean="0">
-                <a:latin typeface="Courier New" pitchFamily="49" charset="0"/>
-                <a:cs typeface="Courier New" pitchFamily="49" charset="0"/>
-              </a:rPr>
-              <a:t>        </a:t>
-            </a:r>
-            <a:r>
-              <a:rPr lang="en-US" sz="2300" dirty="0" err="1" smtClean="0">
-                <a:latin typeface="Courier New" pitchFamily="49" charset="0"/>
-                <a:cs typeface="Courier New" pitchFamily="49" charset="0"/>
-              </a:rPr>
-              <a:t>href</a:t>
-            </a:r>
-            <a:r>
-              <a:rPr lang="en-US" sz="2300" dirty="0" smtClean="0">
-                <a:latin typeface="Courier New" pitchFamily="49" charset="0"/>
-                <a:cs typeface="Courier New" pitchFamily="49" charset="0"/>
-              </a:rPr>
-              <a:t>=</a:t>
-            </a:r>
-            <a:r>
-              <a:rPr lang="en-US" sz="2300" dirty="0" smtClean="0">
-                <a:latin typeface="Courier New" pitchFamily="49" charset="0"/>
-                <a:cs typeface="Courier New" pitchFamily="49" charset="0"/>
-                <a:hlinkClick r:id="rId2"/>
-              </a:rPr>
-              <a:t>“http://</a:t>
-            </a:r>
-            <a:r>
-              <a:rPr lang="en-US" sz="2400" dirty="0" smtClean="0">
-                <a:hlinkClick r:id="rId2"/>
-              </a:rPr>
-              <a:t>http://</a:t>
-            </a:r>
-            <a:r>
-              <a:rPr lang="en-US" sz="2400" dirty="0" smtClean="0">
-                <a:hlinkClick r:id="rId2"/>
-              </a:rPr>
-              <a:t>www.w3schools.com</a:t>
-            </a:r>
-            <a:r>
-              <a:rPr lang="en-US" sz="2400" dirty="0" smtClean="0"/>
-              <a:t>”</a:t>
-            </a:r>
-            <a:endParaRPr lang="en-US" sz="2300" dirty="0" smtClean="0">
-              <a:latin typeface="Courier New" pitchFamily="49" charset="0"/>
-              <a:cs typeface="Courier New" pitchFamily="49" charset="0"/>
-            </a:endParaRPr>
-          </a:p>
-          <a:p>
-            <a:pPr>
-              <a:buNone/>
-            </a:pPr>
-            <a:r>
-              <a:rPr lang="en-US" sz="2300" dirty="0" smtClean="0">
-                <a:latin typeface="Courier New" pitchFamily="49" charset="0"/>
-                <a:cs typeface="Courier New" pitchFamily="49" charset="0"/>
-              </a:rPr>
-              <a:t>      &gt;</a:t>
-            </a:r>
-          </a:p>
-          <a:p>
-            <a:pPr>
-              <a:buNone/>
-            </a:pPr>
-            <a:r>
-              <a:rPr lang="en-US" sz="2300" dirty="0" smtClean="0">
-                <a:latin typeface="Courier New" pitchFamily="49" charset="0"/>
-                <a:cs typeface="Courier New" pitchFamily="49" charset="0"/>
-              </a:rPr>
-              <a:t> </a:t>
-            </a:r>
-            <a:r>
-              <a:rPr lang="en-US" sz="2300" dirty="0" smtClean="0">
-                <a:latin typeface="Courier New" pitchFamily="49" charset="0"/>
-                <a:cs typeface="Courier New" pitchFamily="49" charset="0"/>
-              </a:rPr>
-              <a:t>       w3cschools</a:t>
-            </a:r>
-          </a:p>
-          <a:p>
-            <a:pPr>
-              <a:buNone/>
-            </a:pPr>
-            <a:r>
-              <a:rPr lang="en-US" sz="2300" dirty="0" smtClean="0">
-                <a:latin typeface="Courier New" pitchFamily="49" charset="0"/>
-                <a:cs typeface="Courier New" pitchFamily="49" charset="0"/>
-              </a:rPr>
-              <a:t> </a:t>
-            </a:r>
-            <a:r>
-              <a:rPr lang="en-US" sz="2300" dirty="0" smtClean="0">
-                <a:latin typeface="Courier New" pitchFamily="49" charset="0"/>
-                <a:cs typeface="Courier New" pitchFamily="49" charset="0"/>
-              </a:rPr>
-              <a:t>     &lt;/a&gt;</a:t>
-            </a:r>
-          </a:p>
-          <a:p>
-            <a:pPr>
-              <a:buNone/>
-            </a:pPr>
-            <a:r>
-              <a:rPr lang="en-US" sz="2300" dirty="0" smtClean="0">
-                <a:latin typeface="Courier New" pitchFamily="49" charset="0"/>
-                <a:cs typeface="Courier New" pitchFamily="49" charset="0"/>
-              </a:rPr>
-              <a:t> </a:t>
-            </a:r>
-            <a:r>
-              <a:rPr lang="en-US" sz="2300" dirty="0" smtClean="0">
-                <a:latin typeface="Courier New" pitchFamily="49" charset="0"/>
-                <a:cs typeface="Courier New" pitchFamily="49" charset="0"/>
-              </a:rPr>
-              <a:t>   &lt;/</a:t>
-            </a:r>
-            <a:r>
-              <a:rPr lang="en-US" sz="2300" dirty="0" err="1" smtClean="0">
-                <a:latin typeface="Courier New" pitchFamily="49" charset="0"/>
-                <a:cs typeface="Courier New" pitchFamily="49" charset="0"/>
-              </a:rPr>
-              <a:t>dd</a:t>
-            </a:r>
-            <a:r>
-              <a:rPr lang="en-US" sz="2300" dirty="0" smtClean="0">
-                <a:latin typeface="Courier New" pitchFamily="49" charset="0"/>
-                <a:cs typeface="Courier New" pitchFamily="49" charset="0"/>
-              </a:rPr>
-              <a:t>&gt;</a:t>
-            </a:r>
-            <a:r>
-              <a:rPr lang="en-US" sz="2300" dirty="0" smtClean="0">
-                <a:latin typeface="Courier New" pitchFamily="49" charset="0"/>
-                <a:cs typeface="Courier New" pitchFamily="49" charset="0"/>
-              </a:rPr>
-              <a:t> </a:t>
-            </a:r>
-            <a:endParaRPr lang="en-US" sz="2300" dirty="0" smtClean="0">
-              <a:latin typeface="Courier New" pitchFamily="49" charset="0"/>
-              <a:cs typeface="Courier New" pitchFamily="49" charset="0"/>
-            </a:endParaRPr>
-          </a:p>
-          <a:p>
-            <a:pPr>
-              <a:buNone/>
-            </a:pPr>
-            <a:r>
-              <a:rPr lang="en-US" sz="2300" dirty="0" smtClean="0">
-                <a:latin typeface="Courier New" pitchFamily="49" charset="0"/>
-                <a:cs typeface="Courier New" pitchFamily="49" charset="0"/>
-              </a:rPr>
-              <a:t>    &lt;</a:t>
-            </a:r>
-            <a:r>
-              <a:rPr lang="en-US" sz="2300" dirty="0" err="1" smtClean="0">
-                <a:latin typeface="Courier New" pitchFamily="49" charset="0"/>
-                <a:cs typeface="Courier New" pitchFamily="49" charset="0"/>
-              </a:rPr>
-              <a:t>dt</a:t>
-            </a:r>
-            <a:r>
-              <a:rPr lang="en-US" sz="2300" dirty="0" smtClean="0">
-                <a:latin typeface="Courier New" pitchFamily="49" charset="0"/>
-                <a:cs typeface="Courier New" pitchFamily="49" charset="0"/>
-              </a:rPr>
-              <a:t>&gt;How long does it take to learn HMTL&lt;/</a:t>
-            </a:r>
-            <a:r>
-              <a:rPr lang="en-US" sz="2300" dirty="0" err="1" smtClean="0">
-                <a:latin typeface="Courier New" pitchFamily="49" charset="0"/>
-                <a:cs typeface="Courier New" pitchFamily="49" charset="0"/>
-              </a:rPr>
-              <a:t>dt</a:t>
-            </a:r>
-            <a:r>
-              <a:rPr lang="en-US" sz="2300" dirty="0" smtClean="0">
-                <a:latin typeface="Courier New" pitchFamily="49" charset="0"/>
-                <a:cs typeface="Courier New" pitchFamily="49" charset="0"/>
-              </a:rPr>
-              <a:t>&gt;</a:t>
-            </a:r>
-          </a:p>
-          <a:p>
-            <a:pPr>
-              <a:buNone/>
-            </a:pPr>
-            <a:r>
-              <a:rPr lang="en-US" sz="2300" dirty="0" smtClean="0">
-                <a:latin typeface="Courier New" pitchFamily="49" charset="0"/>
-                <a:cs typeface="Courier New" pitchFamily="49" charset="0"/>
-              </a:rPr>
-              <a:t>    &lt;</a:t>
-            </a:r>
-            <a:r>
-              <a:rPr lang="en-US" sz="2300" dirty="0" err="1" smtClean="0">
-                <a:latin typeface="Courier New" pitchFamily="49" charset="0"/>
-                <a:cs typeface="Courier New" pitchFamily="49" charset="0"/>
-              </a:rPr>
-              <a:t>dd</a:t>
-            </a:r>
-            <a:r>
-              <a:rPr lang="en-US" sz="2300" dirty="0" smtClean="0">
-                <a:latin typeface="Courier New" pitchFamily="49" charset="0"/>
-                <a:cs typeface="Courier New" pitchFamily="49" charset="0"/>
-              </a:rPr>
-              <a:t>&gt;&lt;p&gt;Learning the HTML basics can take a </a:t>
-            </a:r>
-            <a:r>
-              <a:rPr lang="en-US" sz="2300" dirty="0" err="1" smtClean="0">
-                <a:latin typeface="Courier New" pitchFamily="49" charset="0"/>
-                <a:cs typeface="Courier New" pitchFamily="49" charset="0"/>
-              </a:rPr>
-              <a:t>a</a:t>
-            </a:r>
-            <a:r>
-              <a:rPr lang="en-US" sz="2300" dirty="0" smtClean="0">
-                <a:latin typeface="Courier New" pitchFamily="49" charset="0"/>
-                <a:cs typeface="Courier New" pitchFamily="49" charset="0"/>
-              </a:rPr>
-              <a:t> matter of a few hours to a few days. To manage everything else involved in creating web applications can take many years. This is also compounded by the fact that technology is frequently changing&lt;/p&gt;&lt;/</a:t>
-            </a:r>
-            <a:r>
-              <a:rPr lang="en-US" sz="2300" dirty="0" err="1" smtClean="0">
-                <a:latin typeface="Courier New" pitchFamily="49" charset="0"/>
-                <a:cs typeface="Courier New" pitchFamily="49" charset="0"/>
-              </a:rPr>
-              <a:t>dd</a:t>
-            </a:r>
-            <a:r>
-              <a:rPr lang="en-US" sz="2300" dirty="0" smtClean="0">
-                <a:latin typeface="Courier New" pitchFamily="49" charset="0"/>
-                <a:cs typeface="Courier New" pitchFamily="49" charset="0"/>
-              </a:rPr>
-              <a:t>&gt;</a:t>
-            </a:r>
-            <a:endParaRPr lang="en-US" sz="2300" dirty="0" smtClean="0">
-              <a:latin typeface="Courier New" pitchFamily="49" charset="0"/>
-              <a:cs typeface="Courier New" pitchFamily="49" charset="0"/>
-            </a:endParaRPr>
-          </a:p>
-          <a:p>
-            <a:pPr>
-              <a:buNone/>
-            </a:pPr>
-            <a:r>
-              <a:rPr lang="en-US" sz="2300" dirty="0" smtClean="0">
-                <a:latin typeface="Courier New" pitchFamily="49" charset="0"/>
-                <a:cs typeface="Courier New" pitchFamily="49" charset="0"/>
-              </a:rPr>
-              <a:t>&lt;/dl</a:t>
-            </a:r>
-            <a:r>
-              <a:rPr lang="en-US" sz="2300" dirty="0" smtClean="0">
-                <a:latin typeface="Courier New" pitchFamily="49" charset="0"/>
-                <a:cs typeface="Courier New" pitchFamily="49" charset="0"/>
-              </a:rPr>
-              <a:t>&gt;</a:t>
-            </a:r>
-            <a:endParaRPr lang="en-US" sz="2300" dirty="0" smtClean="0">
-              <a:latin typeface="Courier New" pitchFamily="49" charset="0"/>
-              <a:cs typeface="Courier New" pitchFamily="49" charset="0"/>
-            </a:endParaRPr>
+              <a:t>&lt;/dl&gt;</a:t>
+            </a:r>
           </a:p>
           <a:p>
             <a:pPr>
@@ -8106,13 +7757,6 @@
               </a:rPr>
               <a:t>  &lt;table&gt;</a:t>
             </a:r>
-            <a:r>
-              <a:rPr lang="en-US" sz="2000" dirty="0" smtClean="0">
-                <a:latin typeface="Courier New" pitchFamily="49" charset="0"/>
-                <a:cs typeface="Courier New" pitchFamily="49" charset="0"/>
-              </a:rPr>
-              <a:t/>
-            </a:r>
             <a:br>
               <a:rPr lang="en-US" sz="2000" dirty="0" smtClean="0">
                 <a:latin typeface="Courier New" pitchFamily="49" charset="0"/>
@@ -8124,20 +7768,159 @@
                 <a:latin typeface="Courier New" pitchFamily="49" charset="0"/>
                 <a:cs typeface="Courier New" pitchFamily="49" charset="0"/>
               </a:rPr>
-              <a:t>  </a:t>
+              <a:t>  &lt;</a:t>
+            </a:r>
+            <a:r>
+              <a:rPr lang="en-US" sz="2000" dirty="0" err="1" smtClean="0">
+                <a:latin typeface="Courier New" pitchFamily="49" charset="0"/>
+                <a:cs typeface="Courier New" pitchFamily="49" charset="0"/>
+              </a:rPr>
+              <a:t>tr</a:t>
             </a:r>
             <a:r>
               <a:rPr lang="en-US" sz="2000" dirty="0" smtClean="0">
                 <a:latin typeface="Courier New" pitchFamily="49" charset="0"/>
                 <a:cs typeface="Courier New" pitchFamily="49" charset="0"/>
               </a:rPr>
-              <a:t>&lt;</a:t>
+              <a:t>&gt;</a:t>
+            </a:r>
+          </a:p>
+          <a:p>
+            <a:pPr>
+              <a:buNone/>
+            </a:pPr>
+            <a:r>
+              <a:rPr lang="en-US" sz="2000" dirty="0" smtClean="0">
+                <a:latin typeface="Courier New" pitchFamily="49" charset="0"/>
+                <a:cs typeface="Courier New" pitchFamily="49" charset="0"/>
+              </a:rPr>
+              <a:t>       &lt;</a:t>
             </a:r>
             <a:r>
               <a:rPr lang="en-US" sz="2000" dirty="0" err="1" smtClean="0">
                 <a:latin typeface="Courier New" pitchFamily="49" charset="0"/>
                 <a:cs typeface="Courier New" pitchFamily="49" charset="0"/>
               </a:rPr>
+              <a:t>th</a:t>
+            </a:r>
+            <a:r>
+              <a:rPr lang="en-US" sz="2000" dirty="0" smtClean="0">
+                <a:latin typeface="Courier New" pitchFamily="49" charset="0"/>
+                <a:cs typeface="Courier New" pitchFamily="49" charset="0"/>
+              </a:rPr>
+              <a:t>&gt;Name&lt;/</a:t>
+            </a:r>
+            <a:r>
+              <a:rPr lang="en-US" sz="2000" dirty="0" err="1" smtClean="0">
+                <a:latin typeface="Courier New" pitchFamily="49" charset="0"/>
+                <a:cs typeface="Courier New" pitchFamily="49" charset="0"/>
+              </a:rPr>
+              <a:t>th</a:t>
+            </a:r>
+            <a:r>
+              <a:rPr lang="en-US" sz="2000" dirty="0" smtClean="0">
+                <a:latin typeface="Courier New" pitchFamily="49" charset="0"/>
+                <a:cs typeface="Courier New" pitchFamily="49" charset="0"/>
+              </a:rPr>
+              <a:t>&gt;</a:t>
+            </a:r>
+          </a:p>
+          <a:p>
+            <a:pPr>
+              <a:buNone/>
+            </a:pPr>
+            <a:r>
+              <a:rPr lang="en-US" sz="2000" dirty="0" smtClean="0">
+                <a:latin typeface="Courier New" pitchFamily="49" charset="0"/>
+                <a:cs typeface="Courier New" pitchFamily="49" charset="0"/>
+              </a:rPr>
+              <a:t>       &lt;</a:t>
+            </a:r>
+            <a:r>
+              <a:rPr lang="en-US" sz="2000" dirty="0" err="1" smtClean="0">
+                <a:latin typeface="Courier New" pitchFamily="49" charset="0"/>
+                <a:cs typeface="Courier New" pitchFamily="49" charset="0"/>
+              </a:rPr>
+              <a:t>th</a:t>
+            </a:r>
+            <a:r>
+              <a:rPr lang="en-US" sz="2000" dirty="0" smtClean="0">
+                <a:latin typeface="Courier New" pitchFamily="49" charset="0"/>
+                <a:cs typeface="Courier New" pitchFamily="49" charset="0"/>
+              </a:rPr>
+              <a:t>&gt;Cell&lt;/</a:t>
+            </a:r>
+            <a:r>
+              <a:rPr lang="en-US" sz="2000" dirty="0" err="1" smtClean="0">
+                <a:latin typeface="Courier New" pitchFamily="49" charset="0"/>
+                <a:cs typeface="Courier New" pitchFamily="49" charset="0"/>
+              </a:rPr>
+              <a:t>th</a:t>
+            </a:r>
+            <a:r>
+              <a:rPr lang="en-US" sz="2000" dirty="0" smtClean="0">
+                <a:latin typeface="Courier New" pitchFamily="49" charset="0"/>
+                <a:cs typeface="Courier New" pitchFamily="49" charset="0"/>
+              </a:rPr>
+              <a:t>&gt; </a:t>
+            </a:r>
+          </a:p>
+          <a:p>
+            <a:pPr>
+              <a:buNone/>
+            </a:pPr>
+            <a:r>
+              <a:rPr lang="en-US" sz="2000" dirty="0" smtClean="0">
+                <a:latin typeface="Courier New" pitchFamily="49" charset="0"/>
+                <a:cs typeface="Courier New" pitchFamily="49" charset="0"/>
+              </a:rPr>
+              <a:t>       &lt;</a:t>
+            </a:r>
+            <a:r>
+              <a:rPr lang="en-US" sz="2000" dirty="0" err="1" smtClean="0">
+                <a:latin typeface="Courier New" pitchFamily="49" charset="0"/>
+                <a:cs typeface="Courier New" pitchFamily="49" charset="0"/>
+              </a:rPr>
+              <a:t>th</a:t>
+            </a:r>
+            <a:r>
+              <a:rPr lang="en-US" sz="2000" dirty="0" smtClean="0">
+                <a:latin typeface="Courier New" pitchFamily="49" charset="0"/>
+                <a:cs typeface="Courier New" pitchFamily="49" charset="0"/>
+              </a:rPr>
+              <a:t>&gt;Home&lt;/</a:t>
+            </a:r>
+            <a:r>
+              <a:rPr lang="en-US" sz="2000" dirty="0" err="1" smtClean="0">
+                <a:latin typeface="Courier New" pitchFamily="49" charset="0"/>
+                <a:cs typeface="Courier New" pitchFamily="49" charset="0"/>
+              </a:rPr>
+              <a:t>th</a:t>
+            </a:r>
+            <a:r>
+              <a:rPr lang="en-US" sz="2000" dirty="0" smtClean="0">
+                <a:latin typeface="Courier New" pitchFamily="49" charset="0"/>
+                <a:cs typeface="Courier New" pitchFamily="49" charset="0"/>
+              </a:rPr>
+              <a:t>&gt;</a:t>
+            </a:r>
+          </a:p>
+          <a:p>
+            <a:pPr>
+              <a:buNone/>
+            </a:pPr>
+            <a:r>
+              <a:rPr lang="en-US" sz="2000" dirty="0" smtClean="0">
+                <a:latin typeface="Courier New" pitchFamily="49" charset="0"/>
+                <a:cs typeface="Courier New" pitchFamily="49" charset="0"/>
+              </a:rPr>
+              <a:t>    &lt;/</a:t>
+            </a:r>
+            <a:r>
+              <a:rPr lang="en-US" sz="2000" dirty="0" err="1" smtClean="0">
+                <a:latin typeface="Courier New" pitchFamily="49" charset="0"/>
+                <a:cs typeface="Courier New" pitchFamily="49" charset="0"/>
+              </a:rPr>
               <a:t>tr</a:t>
             </a:r>
             <a:r>
@@ -8146,191 +7929,6 @@
                 <a:cs typeface="Courier New" pitchFamily="49" charset="0"/>
               </a:rPr>
               <a:t>&gt;</a:t>
-            </a:r>
-          </a:p>
-          <a:p>
-            <a:pPr>
-              <a:buNone/>
-            </a:pPr>
-            <a:r>
-              <a:rPr lang="en-US" sz="2000" dirty="0" smtClean="0">
-                <a:latin typeface="Courier New" pitchFamily="49" charset="0"/>
-                <a:cs typeface="Courier New" pitchFamily="49" charset="0"/>
-              </a:rPr>
-              <a:t> </a:t>
-            </a:r>
-            <a:r>
-              <a:rPr lang="en-US" sz="2000" dirty="0" smtClean="0">
-                <a:latin typeface="Courier New" pitchFamily="49" charset="0"/>
-                <a:cs typeface="Courier New" pitchFamily="49" charset="0"/>
-              </a:rPr>
-              <a:t>      &lt;</a:t>
-            </a:r>
-            <a:r>
-              <a:rPr lang="en-US" sz="2000" dirty="0" err="1" smtClean="0">
-                <a:latin typeface="Courier New" pitchFamily="49" charset="0"/>
-                <a:cs typeface="Courier New" pitchFamily="49" charset="0"/>
-              </a:rPr>
-              <a:t>th</a:t>
-            </a:r>
-            <a:r>
-              <a:rPr lang="en-US" sz="2000" dirty="0" smtClean="0">
-                <a:latin typeface="Courier New" pitchFamily="49" charset="0"/>
-                <a:cs typeface="Courier New" pitchFamily="49" charset="0"/>
-              </a:rPr>
-              <a:t>&gt;Name&lt;/</a:t>
-            </a:r>
-            <a:r>
-              <a:rPr lang="en-US" sz="2000" dirty="0" err="1" smtClean="0">
-                <a:latin typeface="Courier New" pitchFamily="49" charset="0"/>
-                <a:cs typeface="Courier New" pitchFamily="49" charset="0"/>
-              </a:rPr>
-              <a:t>th</a:t>
-            </a:r>
-            <a:r>
-              <a:rPr lang="en-US" sz="2000" dirty="0" smtClean="0">
-                <a:latin typeface="Courier New" pitchFamily="49" charset="0"/>
-                <a:cs typeface="Courier New" pitchFamily="49" charset="0"/>
-              </a:rPr>
-              <a:t>&gt;</a:t>
-            </a:r>
-          </a:p>
-          <a:p>
-            <a:pPr>
-              <a:buNone/>
-            </a:pPr>
-            <a:r>
-              <a:rPr lang="en-US" sz="2000" dirty="0" smtClean="0">
-                <a:latin typeface="Courier New" pitchFamily="49" charset="0"/>
-                <a:cs typeface="Courier New" pitchFamily="49" charset="0"/>
-              </a:rPr>
-              <a:t>       </a:t>
-            </a:r>
-            <a:r>
-              <a:rPr lang="en-US" sz="2000" dirty="0" smtClean="0">
-                <a:latin typeface="Courier New" pitchFamily="49" charset="0"/>
-                <a:cs typeface="Courier New" pitchFamily="49" charset="0"/>
-              </a:rPr>
-              <a:t>&lt;</a:t>
-            </a:r>
-            <a:r>
-              <a:rPr lang="en-US" sz="2000" dirty="0" err="1" smtClean="0">
-                <a:latin typeface="Courier New" pitchFamily="49" charset="0"/>
-                <a:cs typeface="Courier New" pitchFamily="49" charset="0"/>
-              </a:rPr>
-              <a:t>th</a:t>
-            </a:r>
-            <a:r>
-              <a:rPr lang="en-US" sz="2000" dirty="0" smtClean="0">
-                <a:latin typeface="Courier New" pitchFamily="49" charset="0"/>
-                <a:cs typeface="Courier New" pitchFamily="49" charset="0"/>
-              </a:rPr>
-              <a:t>&gt;Cell&lt;/</a:t>
-            </a:r>
-            <a:r>
-              <a:rPr lang="en-US" sz="2000" dirty="0" err="1" smtClean="0">
-                <a:latin typeface="Courier New" pitchFamily="49" charset="0"/>
-                <a:cs typeface="Courier New" pitchFamily="49" charset="0"/>
-              </a:rPr>
-              <a:t>th</a:t>
-            </a:r>
-            <a:r>
-              <a:rPr lang="en-US" sz="2000" dirty="0" smtClean="0">
-                <a:latin typeface="Courier New" pitchFamily="49" charset="0"/>
-                <a:cs typeface="Courier New" pitchFamily="49" charset="0"/>
-              </a:rPr>
-              <a:t>&gt;</a:t>
-            </a:r>
-            <a:r>
-              <a:rPr lang="en-US" sz="2000" dirty="0" smtClean="0">
-                <a:latin typeface="Courier New" pitchFamily="49" charset="0"/>
-                <a:cs typeface="Courier New" pitchFamily="49" charset="0"/>
-              </a:rPr>
-              <a:t> </a:t>
-            </a:r>
-            <a:endParaRPr lang="en-US" sz="2000" dirty="0" smtClean="0">
-              <a:latin typeface="Courier New" pitchFamily="49" charset="0"/>
-              <a:cs typeface="Courier New" pitchFamily="49" charset="0"/>
-            </a:endParaRPr>
-          </a:p>
-          <a:p>
-            <a:pPr>
-              <a:buNone/>
-            </a:pPr>
-            <a:r>
-              <a:rPr lang="en-US" sz="2000" dirty="0" smtClean="0">
-                <a:latin typeface="Courier New" pitchFamily="49" charset="0"/>
-                <a:cs typeface="Courier New" pitchFamily="49" charset="0"/>
-              </a:rPr>
-              <a:t> </a:t>
-            </a:r>
-            <a:r>
-              <a:rPr lang="en-US" sz="2000" dirty="0" smtClean="0">
-                <a:latin typeface="Courier New" pitchFamily="49" charset="0"/>
-                <a:cs typeface="Courier New" pitchFamily="49" charset="0"/>
-              </a:rPr>
-              <a:t>      &lt;</a:t>
-            </a:r>
-            <a:r>
-              <a:rPr lang="en-US" sz="2000" dirty="0" err="1" smtClean="0">
-                <a:latin typeface="Courier New" pitchFamily="49" charset="0"/>
-                <a:cs typeface="Courier New" pitchFamily="49" charset="0"/>
-              </a:rPr>
-              <a:t>th</a:t>
-            </a:r>
-            <a:r>
-              <a:rPr lang="en-US" sz="2000" dirty="0" smtClean="0">
-                <a:latin typeface="Courier New" pitchFamily="49" charset="0"/>
-                <a:cs typeface="Courier New" pitchFamily="49" charset="0"/>
-              </a:rPr>
-              <a:t>&gt;Home&lt;/</a:t>
-            </a:r>
-            <a:r>
-              <a:rPr lang="en-US" sz="2000" dirty="0" err="1" smtClean="0">
-                <a:latin typeface="Courier New" pitchFamily="49" charset="0"/>
-                <a:cs typeface="Courier New" pitchFamily="49" charset="0"/>
-              </a:rPr>
-              <a:t>th</a:t>
-            </a:r>
-            <a:r>
-              <a:rPr lang="en-US" sz="2000" dirty="0" smtClean="0">
-                <a:latin typeface="Courier New" pitchFamily="49" charset="0"/>
-                <a:cs typeface="Courier New" pitchFamily="49" charset="0"/>
-              </a:rPr>
-              <a:t>&gt;</a:t>
-            </a:r>
-          </a:p>
-          <a:p>
-            <a:pPr>
-              <a:buNone/>
-            </a:pPr>
-            <a:r>
-              <a:rPr lang="en-US" sz="2000" dirty="0" smtClean="0">
-                <a:latin typeface="Courier New" pitchFamily="49" charset="0"/>
-                <a:cs typeface="Courier New" pitchFamily="49" charset="0"/>
-              </a:rPr>
-              <a:t>    &lt;/</a:t>
-            </a:r>
-            <a:r>
-              <a:rPr lang="en-US" sz="2000" dirty="0" err="1" smtClean="0">
-                <a:latin typeface="Courier New" pitchFamily="49" charset="0"/>
-                <a:cs typeface="Courier New" pitchFamily="49" charset="0"/>
-              </a:rPr>
-              <a:t>tr</a:t>
-            </a:r>
-            <a:r>
-              <a:rPr lang="en-US" sz="2000" dirty="0" smtClean="0">
-                <a:latin typeface="Courier New" pitchFamily="49" charset="0"/>
-                <a:cs typeface="Courier New" pitchFamily="49" charset="0"/>
-              </a:rPr>
-              <a:t>&gt;</a:t>
-            </a:r>
-            <a:r>
-              <a:rPr lang="en-US" sz="2000" dirty="0" smtClean="0">
-                <a:latin typeface="Courier New" pitchFamily="49" charset="0"/>
-                <a:cs typeface="Courier New" pitchFamily="49" charset="0"/>
-              </a:rPr>
-              <a:t/>
             </a:r>
             <a:br>
               <a:rPr lang="en-US" sz="2000" dirty="0" smtClean="0">
@@ -8343,14 +7941,69 @@
                 <a:latin typeface="Courier New" pitchFamily="49" charset="0"/>
                 <a:cs typeface="Courier New" pitchFamily="49" charset="0"/>
               </a:rPr>
-              <a:t>  </a:t>
+              <a:t>  &lt;</a:t>
+            </a:r>
+            <a:r>
+              <a:rPr lang="en-US" sz="2000" dirty="0" err="1" smtClean="0">
+                <a:latin typeface="Courier New" pitchFamily="49" charset="0"/>
+                <a:cs typeface="Courier New" pitchFamily="49" charset="0"/>
+              </a:rPr>
+              <a:t>tr</a:t>
             </a:r>
             <a:r>
               <a:rPr lang="en-US" sz="2000" dirty="0" smtClean="0">
                 <a:latin typeface="Courier New" pitchFamily="49" charset="0"/>
                 <a:cs typeface="Courier New" pitchFamily="49" charset="0"/>
               </a:rPr>
-              <a:t>&lt;</a:t>
+              <a:t>&gt;</a:t>
+            </a:r>
+          </a:p>
+          <a:p>
+            <a:pPr>
+              <a:buNone/>
+            </a:pPr>
+            <a:r>
+              <a:rPr lang="en-US" sz="2000" dirty="0" smtClean="0">
+                <a:latin typeface="Courier New" pitchFamily="49" charset="0"/>
+                <a:cs typeface="Courier New" pitchFamily="49" charset="0"/>
+              </a:rPr>
+              <a:t>       &lt;td&gt;John Doe&lt;/td&gt;</a:t>
+            </a:r>
+          </a:p>
+          <a:p>
+            <a:pPr>
+              <a:buNone/>
+            </a:pPr>
+            <a:r>
+              <a:rPr lang="en-US" sz="2000" dirty="0" smtClean="0">
+                <a:latin typeface="Courier New" pitchFamily="49" charset="0"/>
+                <a:cs typeface="Courier New" pitchFamily="49" charset="0"/>
+              </a:rPr>
+              <a:t>       &lt;td&gt;555-1234&lt;/td&gt; </a:t>
+            </a:r>
+          </a:p>
+          <a:p>
+            <a:pPr>
+              <a:buNone/>
+            </a:pPr>
+            <a:r>
+              <a:rPr lang="en-US" sz="2000" dirty="0" smtClean="0">
+                <a:latin typeface="Courier New" pitchFamily="49" charset="0"/>
+                <a:cs typeface="Courier New" pitchFamily="49" charset="0"/>
+              </a:rPr>
+              <a:t>       &lt;td&gt;555-5432&lt;/td&gt;</a:t>
+            </a:r>
+          </a:p>
+          <a:p>
+            <a:pPr>
+              <a:buNone/>
+            </a:pPr>
+            <a:r>
+              <a:rPr lang="en-US" sz="2000" dirty="0" smtClean="0">
+                <a:latin typeface="Courier New" pitchFamily="49" charset="0"/>
+                <a:cs typeface="Courier New" pitchFamily="49" charset="0"/>
+              </a:rPr>
+              <a:t>    &lt;/</a:t>
             </a:r>
             <a:r>
               <a:rPr lang="en-US" sz="2000" dirty="0" err="1" smtClean="0">
@@ -8365,125 +8018,6 @@
                 <a:cs typeface="Courier New" pitchFamily="49" charset="0"/>
               </a:rPr>
               <a:t>&gt;</a:t>
-            </a:r>
-          </a:p>
-          <a:p>
-            <a:pPr>
-              <a:buNone/>
-            </a:pPr>
-            <a:r>
-              <a:rPr lang="en-US" sz="2000" dirty="0" smtClean="0">
-                <a:latin typeface="Courier New" pitchFamily="49" charset="0"/>
-                <a:cs typeface="Courier New" pitchFamily="49" charset="0"/>
-              </a:rPr>
-              <a:t> </a:t>
-            </a:r>
-            <a:r>
-              <a:rPr lang="en-US" sz="2000" dirty="0" smtClean="0">
-                <a:latin typeface="Courier New" pitchFamily="49" charset="0"/>
-                <a:cs typeface="Courier New" pitchFamily="49" charset="0"/>
-              </a:rPr>
-              <a:t>      </a:t>
-            </a:r>
-            <a:r>
-              <a:rPr lang="en-US" sz="2000" dirty="0" smtClean="0">
-                <a:latin typeface="Courier New" pitchFamily="49" charset="0"/>
-                <a:cs typeface="Courier New" pitchFamily="49" charset="0"/>
-              </a:rPr>
-              <a:t>&lt;</a:t>
-            </a:r>
-            <a:r>
-              <a:rPr lang="en-US" sz="2000" dirty="0" smtClean="0">
-                <a:latin typeface="Courier New" pitchFamily="49" charset="0"/>
-                <a:cs typeface="Courier New" pitchFamily="49" charset="0"/>
-              </a:rPr>
-              <a:t>td&gt;John Doe&lt;/td&gt;</a:t>
-            </a:r>
-            <a:endParaRPr lang="en-US" sz="2000" dirty="0" smtClean="0">
-              <a:latin typeface="Courier New" pitchFamily="49" charset="0"/>
-              <a:cs typeface="Courier New" pitchFamily="49" charset="0"/>
-            </a:endParaRPr>
-          </a:p>
-          <a:p>
-            <a:pPr>
-              <a:buNone/>
-            </a:pPr>
-            <a:r>
-              <a:rPr lang="en-US" sz="2000" dirty="0" smtClean="0">
-                <a:latin typeface="Courier New" pitchFamily="49" charset="0"/>
-                <a:cs typeface="Courier New" pitchFamily="49" charset="0"/>
-              </a:rPr>
-              <a:t>       &lt;</a:t>
-            </a:r>
-            <a:r>
-              <a:rPr lang="en-US" sz="2000" dirty="0" smtClean="0">
-                <a:latin typeface="Courier New" pitchFamily="49" charset="0"/>
-                <a:cs typeface="Courier New" pitchFamily="49" charset="0"/>
-              </a:rPr>
-              <a:t>td&gt;555-1234&lt;/td&gt; </a:t>
-            </a:r>
-            <a:endParaRPr lang="en-US" sz="2000" dirty="0" smtClean="0">
-              <a:latin typeface="Courier New" pitchFamily="49" charset="0"/>
-              <a:cs typeface="Courier New" pitchFamily="49" charset="0"/>
-            </a:endParaRPr>
-          </a:p>
-          <a:p>
-            <a:pPr>
-              <a:buNone/>
-            </a:pPr>
-            <a:r>
-              <a:rPr lang="en-US" sz="2000" dirty="0" smtClean="0">
-                <a:latin typeface="Courier New" pitchFamily="49" charset="0"/>
-                <a:cs typeface="Courier New" pitchFamily="49" charset="0"/>
-              </a:rPr>
-              <a:t>       &lt;</a:t>
-            </a:r>
-            <a:r>
-              <a:rPr lang="en-US" sz="2000" dirty="0" smtClean="0">
-                <a:latin typeface="Courier New" pitchFamily="49" charset="0"/>
-                <a:cs typeface="Courier New" pitchFamily="49" charset="0"/>
-              </a:rPr>
-              <a:t>td&gt;555-5432&lt;/td&gt;</a:t>
-            </a:r>
-          </a:p>
-          <a:p>
-            <a:pPr>
-              <a:buNone/>
-            </a:pPr>
-            <a:r>
-              <a:rPr lang="en-US" sz="2000" dirty="0" smtClean="0">
-                <a:latin typeface="Courier New" pitchFamily="49" charset="0"/>
-                <a:cs typeface="Courier New" pitchFamily="49" charset="0"/>
-              </a:rPr>
-              <a:t> </a:t>
-            </a:r>
-            <a:r>
-              <a:rPr lang="en-US" sz="2000" dirty="0" smtClean="0">
-                <a:latin typeface="Courier New" pitchFamily="49" charset="0"/>
-                <a:cs typeface="Courier New" pitchFamily="49" charset="0"/>
-              </a:rPr>
-              <a:t>   &lt;/</a:t>
-            </a:r>
-            <a:r>
-              <a:rPr lang="en-US" sz="2000" dirty="0" err="1" smtClean="0">
-                <a:latin typeface="Courier New" pitchFamily="49" charset="0"/>
-                <a:cs typeface="Courier New" pitchFamily="49" charset="0"/>
-              </a:rPr>
-              <a:t>tr</a:t>
-            </a:r>
-            <a:r>
-              <a:rPr lang="en-US" sz="2000" dirty="0" smtClean="0">
-                <a:latin typeface="Courier New" pitchFamily="49" charset="0"/>
-                <a:cs typeface="Courier New" pitchFamily="49" charset="0"/>
-              </a:rPr>
-              <a:t>&gt;</a:t>
-            </a:r>
-            <a:r>
-              <a:rPr lang="en-US" sz="2000" dirty="0" smtClean="0">
-                <a:latin typeface="Courier New" pitchFamily="49" charset="0"/>
-                <a:cs typeface="Courier New" pitchFamily="49" charset="0"/>
-              </a:rPr>
-              <a:t/>
             </a:r>
             <a:br>
               <a:rPr lang="en-US" sz="2000" dirty="0" smtClean="0">
@@ -8522,73 +8056,31 @@
                 <a:latin typeface="Courier New" pitchFamily="49" charset="0"/>
                 <a:cs typeface="Courier New" pitchFamily="49" charset="0"/>
               </a:rPr>
-              <a:t>       &lt;</a:t>
-            </a:r>
+              <a:t>       &lt;td&gt;Jane Doe&lt;/td&gt;</a:t>
+            </a:r>
+          </a:p>
+          <a:p>
+            <a:pPr>
+              <a:buNone/>
+            </a:pPr>
             <a:r>
               <a:rPr lang="en-US" sz="2000" dirty="0" smtClean="0">
                 <a:latin typeface="Courier New" pitchFamily="49" charset="0"/>
                 <a:cs typeface="Courier New" pitchFamily="49" charset="0"/>
               </a:rPr>
-              <a:t>td&gt;Jane Doe&lt;/</a:t>
-            </a:r>
+              <a:t>       &lt;td&gt;555-8976&lt;/td&gt; </a:t>
+            </a:r>
+          </a:p>
+          <a:p>
+            <a:pPr>
+              <a:buNone/>
+            </a:pPr>
             <a:r>
               <a:rPr lang="en-US" sz="2000" dirty="0" smtClean="0">
                 <a:latin typeface="Courier New" pitchFamily="49" charset="0"/>
                 <a:cs typeface="Courier New" pitchFamily="49" charset="0"/>
               </a:rPr>
-              <a:t>td&gt;</a:t>
-            </a:r>
-          </a:p>
-          <a:p>
-            <a:pPr>
-              <a:buNone/>
-            </a:pPr>
-            <a:r>
-              <a:rPr lang="en-US" sz="2000" dirty="0" smtClean="0">
-                <a:latin typeface="Courier New" pitchFamily="49" charset="0"/>
-                <a:cs typeface="Courier New" pitchFamily="49" charset="0"/>
-              </a:rPr>
-              <a:t>       &lt;</a:t>
-            </a:r>
-            <a:r>
-              <a:rPr lang="en-US" sz="2000" dirty="0" smtClean="0">
-                <a:latin typeface="Courier New" pitchFamily="49" charset="0"/>
-                <a:cs typeface="Courier New" pitchFamily="49" charset="0"/>
-              </a:rPr>
-              <a:t>td&gt;555-8976&lt;/</a:t>
-            </a:r>
-            <a:r>
-              <a:rPr lang="en-US" sz="2000" dirty="0" smtClean="0">
-                <a:latin typeface="Courier New" pitchFamily="49" charset="0"/>
-                <a:cs typeface="Courier New" pitchFamily="49" charset="0"/>
-              </a:rPr>
-              <a:t>td&gt; </a:t>
-            </a:r>
-          </a:p>
-          <a:p>
-            <a:pPr>
-              <a:buNone/>
-            </a:pPr>
-            <a:r>
-              <a:rPr lang="en-US" sz="2000" dirty="0" smtClean="0">
-                <a:latin typeface="Courier New" pitchFamily="49" charset="0"/>
-                <a:cs typeface="Courier New" pitchFamily="49" charset="0"/>
-              </a:rPr>
-              <a:t>       &lt;</a:t>
-            </a:r>
-            <a:r>
-              <a:rPr lang="en-US" sz="2000" dirty="0" smtClean="0">
-                <a:latin typeface="Courier New" pitchFamily="49" charset="0"/>
-                <a:cs typeface="Courier New" pitchFamily="49" charset="0"/>
-              </a:rPr>
-              <a:t>td&gt;555-3456&lt;/</a:t>
-            </a:r>
-            <a:r>
-              <a:rPr lang="en-US" sz="2000" dirty="0" smtClean="0">
-                <a:latin typeface="Courier New" pitchFamily="49" charset="0"/>
-                <a:cs typeface="Courier New" pitchFamily="49" charset="0"/>
-              </a:rPr>
-              <a:t>td&gt;</a:t>
+              <a:t>       &lt;td&gt;555-3456&lt;/td&gt;</a:t>
             </a:r>
           </a:p>
           <a:p>
@@ -8629,10 +8121,6 @@
               </a:rPr>
               <a:t>&lt;/table&gt;</a:t>
             </a:r>
-            <a:endParaRPr lang="en-US" sz="2000" dirty="0" smtClean="0">
-              <a:latin typeface="Courier New" pitchFamily="49" charset="0"/>
-              <a:cs typeface="Courier New" pitchFamily="49" charset="0"/>
-            </a:endParaRPr>
           </a:p>
           <a:p>
             <a:pPr>

</xml_diff>